<commit_message>
Updated dg diagrams plus dg
</commit_message>
<xml_diff>
--- a/docs/diagrams/StorageComponentClassDiagram.pptx
+++ b/docs/diagrams/StorageComponentClassDiagram.pptx
@@ -208,7 +208,7 @@
           <a:p>
             <a:fld id="{F5CC4B3F-88C1-4FFA-B1B6-F41C21DC6924}" type="datetimeFigureOut">
               <a:rPr lang="en-US" smtClean="0"/>
-              <a:t>10/30/2018</a:t>
+              <a:t>11/6/2018</a:t>
             </a:fld>
             <a:endParaRPr lang="en-US"/>
           </a:p>
@@ -654,7 +654,7 @@
           <a:p>
             <a:fld id="{78C97017-6FC3-485B-9764-EAC9E56C1D49}" type="datetimeFigureOut">
               <a:rPr lang="en-US" smtClean="0"/>
-              <a:t>10/30/2018</a:t>
+              <a:t>11/6/2018</a:t>
             </a:fld>
             <a:endParaRPr lang="en-US"/>
           </a:p>
@@ -822,7 +822,7 @@
           <a:p>
             <a:fld id="{78C97017-6FC3-485B-9764-EAC9E56C1D49}" type="datetimeFigureOut">
               <a:rPr lang="en-US" smtClean="0"/>
-              <a:t>10/30/2018</a:t>
+              <a:t>11/6/2018</a:t>
             </a:fld>
             <a:endParaRPr lang="en-US"/>
           </a:p>
@@ -1000,7 +1000,7 @@
           <a:p>
             <a:fld id="{78C97017-6FC3-485B-9764-EAC9E56C1D49}" type="datetimeFigureOut">
               <a:rPr lang="en-US" smtClean="0"/>
-              <a:t>10/30/2018</a:t>
+              <a:t>11/6/2018</a:t>
             </a:fld>
             <a:endParaRPr lang="en-US"/>
           </a:p>
@@ -1168,7 +1168,7 @@
           <a:p>
             <a:fld id="{78C97017-6FC3-485B-9764-EAC9E56C1D49}" type="datetimeFigureOut">
               <a:rPr lang="en-US" smtClean="0"/>
-              <a:t>10/30/2018</a:t>
+              <a:t>11/6/2018</a:t>
             </a:fld>
             <a:endParaRPr lang="en-US"/>
           </a:p>
@@ -1413,7 +1413,7 @@
           <a:p>
             <a:fld id="{78C97017-6FC3-485B-9764-EAC9E56C1D49}" type="datetimeFigureOut">
               <a:rPr lang="en-US" smtClean="0"/>
-              <a:t>10/30/2018</a:t>
+              <a:t>11/6/2018</a:t>
             </a:fld>
             <a:endParaRPr lang="en-US"/>
           </a:p>
@@ -1698,7 +1698,7 @@
           <a:p>
             <a:fld id="{78C97017-6FC3-485B-9764-EAC9E56C1D49}" type="datetimeFigureOut">
               <a:rPr lang="en-US" smtClean="0"/>
-              <a:t>10/30/2018</a:t>
+              <a:t>11/6/2018</a:t>
             </a:fld>
             <a:endParaRPr lang="en-US"/>
           </a:p>
@@ -2117,7 +2117,7 @@
           <a:p>
             <a:fld id="{78C97017-6FC3-485B-9764-EAC9E56C1D49}" type="datetimeFigureOut">
               <a:rPr lang="en-US" smtClean="0"/>
-              <a:t>10/30/2018</a:t>
+              <a:t>11/6/2018</a:t>
             </a:fld>
             <a:endParaRPr lang="en-US"/>
           </a:p>
@@ -2234,7 +2234,7 @@
           <a:p>
             <a:fld id="{78C97017-6FC3-485B-9764-EAC9E56C1D49}" type="datetimeFigureOut">
               <a:rPr lang="en-US" smtClean="0"/>
-              <a:t>10/30/2018</a:t>
+              <a:t>11/6/2018</a:t>
             </a:fld>
             <a:endParaRPr lang="en-US"/>
           </a:p>
@@ -2329,7 +2329,7 @@
           <a:p>
             <a:fld id="{78C97017-6FC3-485B-9764-EAC9E56C1D49}" type="datetimeFigureOut">
               <a:rPr lang="en-US" smtClean="0"/>
-              <a:t>10/30/2018</a:t>
+              <a:t>11/6/2018</a:t>
             </a:fld>
             <a:endParaRPr lang="en-US"/>
           </a:p>
@@ -2604,7 +2604,7 @@
           <a:p>
             <a:fld id="{78C97017-6FC3-485B-9764-EAC9E56C1D49}" type="datetimeFigureOut">
               <a:rPr lang="en-US" smtClean="0"/>
-              <a:t>10/30/2018</a:t>
+              <a:t>11/6/2018</a:t>
             </a:fld>
             <a:endParaRPr lang="en-US"/>
           </a:p>
@@ -2856,7 +2856,7 @@
           <a:p>
             <a:fld id="{78C97017-6FC3-485B-9764-EAC9E56C1D49}" type="datetimeFigureOut">
               <a:rPr lang="en-US" smtClean="0"/>
-              <a:t>10/30/2018</a:t>
+              <a:t>11/6/2018</a:t>
             </a:fld>
             <a:endParaRPr lang="en-US"/>
           </a:p>
@@ -3067,7 +3067,7 @@
           <a:p>
             <a:fld id="{78C97017-6FC3-485B-9764-EAC9E56C1D49}" type="datetimeFigureOut">
               <a:rPr lang="en-US" smtClean="0"/>
-              <a:t>10/30/2018</a:t>
+              <a:t>11/6/2018</a:t>
             </a:fld>
             <a:endParaRPr lang="en-US"/>
           </a:p>
@@ -3450,7 +3450,7 @@
         </p:nvSpPr>
         <p:spPr>
           <a:xfrm>
-            <a:off x="457200" y="2133600"/>
+            <a:off x="352313" y="2125877"/>
             <a:ext cx="8439374" cy="4100500"/>
           </a:xfrm>
           <a:prstGeom prst="roundRect">
@@ -4064,8 +4064,8 @@
         <p:nvCxnSpPr>
           <p:cNvPr id="124" name="Elbow Connector 122"/>
           <p:cNvCxnSpPr>
+            <a:cxnSpLocks/>
             <a:stCxn id="50" idx="3"/>
-            <a:endCxn id="66" idx="1"/>
           </p:cNvCxnSpPr>
           <p:nvPr/>
         </p:nvCxnSpPr>
@@ -4534,275 +4534,6 @@
       </p:sp>
       <p:sp>
         <p:nvSpPr>
-          <p:cNvPr id="66" name="Rectangle 8"/>
-          <p:cNvSpPr/>
-          <p:nvPr/>
-        </p:nvSpPr>
-        <p:spPr>
-          <a:xfrm>
-            <a:off x="5357135" y="3207628"/>
-            <a:ext cx="1200707" cy="346760"/>
-          </a:xfrm>
-          <a:prstGeom prst="rect">
-            <a:avLst/>
-          </a:prstGeom>
-          <a:ln w="19050"/>
-          <a:effectLst/>
-        </p:spPr>
-        <p:style>
-          <a:lnRef idx="1">
-            <a:schemeClr val="accent6"/>
-          </a:lnRef>
-          <a:fillRef idx="2">
-            <a:schemeClr val="accent6"/>
-          </a:fillRef>
-          <a:effectRef idx="1">
-            <a:schemeClr val="accent6"/>
-          </a:effectRef>
-          <a:fontRef idx="minor">
-            <a:schemeClr val="dk1"/>
-          </a:fontRef>
-        </p:style>
-        <p:txBody>
-          <a:bodyPr rtlCol="0" anchor="ctr"/>
-          <a:lstStyle/>
-          <a:p>
-            <a:pPr algn="ctr"/>
-            <a:r>
-              <a:rPr lang="en-US" sz="1050" b="1" dirty="0" err="1">
-                <a:solidFill>
-                  <a:schemeClr val="accent6">
-                    <a:lumMod val="75000"/>
-                  </a:schemeClr>
-                </a:solidFill>
-              </a:rPr>
-              <a:t>XmlSerializable</a:t>
-            </a:r>
-            <a:br>
-              <a:rPr lang="en-US" sz="1050" b="1" dirty="0">
-                <a:solidFill>
-                  <a:schemeClr val="accent6">
-                    <a:lumMod val="75000"/>
-                  </a:schemeClr>
-                </a:solidFill>
-              </a:rPr>
-            </a:br>
-            <a:r>
-              <a:rPr lang="en-US" sz="1050" b="1" dirty="0" err="1">
-                <a:solidFill>
-                  <a:schemeClr val="accent6">
-                    <a:lumMod val="75000"/>
-                  </a:schemeClr>
-                </a:solidFill>
-              </a:rPr>
-              <a:t>AddressBook</a:t>
-            </a:r>
-            <a:endParaRPr lang="en-SG" sz="1050" b="1" dirty="0">
-              <a:solidFill>
-                <a:schemeClr val="accent6">
-                  <a:lumMod val="75000"/>
-                </a:schemeClr>
-              </a:solidFill>
-            </a:endParaRPr>
-          </a:p>
-        </p:txBody>
-      </p:sp>
-      <p:cxnSp>
-        <p:nvCxnSpPr>
-          <p:cNvPr id="70" name="Elbow Connector 122"/>
-          <p:cNvCxnSpPr>
-            <a:stCxn id="74" idx="0"/>
-            <a:endCxn id="73" idx="2"/>
-          </p:cNvCxnSpPr>
-          <p:nvPr/>
-        </p:nvCxnSpPr>
-        <p:spPr>
-          <a:xfrm rot="5400000" flipH="1" flipV="1">
-            <a:off x="7415328" y="3039238"/>
-            <a:ext cx="335208" cy="12700"/>
-          </a:xfrm>
-          <a:prstGeom prst="bentConnector3">
-            <a:avLst>
-              <a:gd name="adj1" fmla="val 50000"/>
-            </a:avLst>
-          </a:prstGeom>
-          <a:ln w="19050">
-            <a:prstDash val="sysDot"/>
-            <a:headEnd type="none" w="med" len="med"/>
-            <a:tailEnd type="arrow" w="med" len="med"/>
-          </a:ln>
-          <a:effectLst/>
-        </p:spPr>
-        <p:style>
-          <a:lnRef idx="1">
-            <a:schemeClr val="accent6"/>
-          </a:lnRef>
-          <a:fillRef idx="2">
-            <a:schemeClr val="accent6"/>
-          </a:fillRef>
-          <a:effectRef idx="1">
-            <a:schemeClr val="accent6"/>
-          </a:effectRef>
-          <a:fontRef idx="minor">
-            <a:schemeClr val="dk1"/>
-          </a:fontRef>
-        </p:style>
-      </p:cxnSp>
-      <p:sp>
-        <p:nvSpPr>
-          <p:cNvPr id="73" name="Rectangle 8"/>
-          <p:cNvSpPr/>
-          <p:nvPr/>
-        </p:nvSpPr>
-        <p:spPr>
-          <a:xfrm>
-            <a:off x="6953073" y="2524874"/>
-            <a:ext cx="1259718" cy="346760"/>
-          </a:xfrm>
-          <a:prstGeom prst="rect">
-            <a:avLst/>
-          </a:prstGeom>
-          <a:ln w="19050"/>
-          <a:effectLst/>
-        </p:spPr>
-        <p:style>
-          <a:lnRef idx="1">
-            <a:schemeClr val="accent6"/>
-          </a:lnRef>
-          <a:fillRef idx="2">
-            <a:schemeClr val="accent6"/>
-          </a:fillRef>
-          <a:effectRef idx="1">
-            <a:schemeClr val="accent6"/>
-          </a:effectRef>
-          <a:fontRef idx="minor">
-            <a:schemeClr val="dk1"/>
-          </a:fontRef>
-        </p:style>
-        <p:txBody>
-          <a:bodyPr rtlCol="0" anchor="ctr"/>
-          <a:lstStyle/>
-          <a:p>
-            <a:pPr algn="ctr"/>
-            <a:r>
-              <a:rPr lang="en-US" sz="1050" b="1" dirty="0" err="1">
-                <a:solidFill>
-                  <a:schemeClr val="accent6">
-                    <a:lumMod val="75000"/>
-                  </a:schemeClr>
-                </a:solidFill>
-              </a:rPr>
-              <a:t>XmlAdaptedTag</a:t>
-            </a:r>
-            <a:endParaRPr lang="en-SG" sz="1050" b="1" dirty="0">
-              <a:solidFill>
-                <a:schemeClr val="accent6">
-                  <a:lumMod val="75000"/>
-                </a:schemeClr>
-              </a:solidFill>
-            </a:endParaRPr>
-          </a:p>
-        </p:txBody>
-      </p:sp>
-      <p:sp>
-        <p:nvSpPr>
-          <p:cNvPr id="74" name="Rectangle 8"/>
-          <p:cNvSpPr/>
-          <p:nvPr/>
-        </p:nvSpPr>
-        <p:spPr>
-          <a:xfrm>
-            <a:off x="6953073" y="3206842"/>
-            <a:ext cx="1259718" cy="346760"/>
-          </a:xfrm>
-          <a:prstGeom prst="rect">
-            <a:avLst/>
-          </a:prstGeom>
-          <a:ln w="19050"/>
-          <a:effectLst/>
-        </p:spPr>
-        <p:style>
-          <a:lnRef idx="1">
-            <a:schemeClr val="accent6"/>
-          </a:lnRef>
-          <a:fillRef idx="2">
-            <a:schemeClr val="accent6"/>
-          </a:fillRef>
-          <a:effectRef idx="1">
-            <a:schemeClr val="accent6"/>
-          </a:effectRef>
-          <a:fontRef idx="minor">
-            <a:schemeClr val="dk1"/>
-          </a:fontRef>
-        </p:style>
-        <p:txBody>
-          <a:bodyPr rtlCol="0" anchor="ctr"/>
-          <a:lstStyle/>
-          <a:p>
-            <a:pPr algn="ctr"/>
-            <a:r>
-              <a:rPr lang="en-US" sz="1050" b="1" dirty="0" err="1">
-                <a:solidFill>
-                  <a:schemeClr val="accent6">
-                    <a:lumMod val="75000"/>
-                  </a:schemeClr>
-                </a:solidFill>
-              </a:rPr>
-              <a:t>XmlAdaptedPerson</a:t>
-            </a:r>
-            <a:endParaRPr lang="en-SG" sz="1050" b="1" dirty="0">
-              <a:solidFill>
-                <a:schemeClr val="accent6">
-                  <a:lumMod val="75000"/>
-                </a:schemeClr>
-              </a:solidFill>
-            </a:endParaRPr>
-          </a:p>
-        </p:txBody>
-      </p:sp>
-      <p:cxnSp>
-        <p:nvCxnSpPr>
-          <p:cNvPr id="77" name="Elbow Connector 122"/>
-          <p:cNvCxnSpPr>
-            <a:stCxn id="66" idx="3"/>
-            <a:endCxn id="74" idx="1"/>
-          </p:cNvCxnSpPr>
-          <p:nvPr/>
-        </p:nvCxnSpPr>
-        <p:spPr>
-          <a:xfrm flipV="1">
-            <a:off x="6557842" y="3380222"/>
-            <a:ext cx="395231" cy="786"/>
-          </a:xfrm>
-          <a:prstGeom prst="bentConnector3">
-            <a:avLst>
-              <a:gd name="adj1" fmla="val 50000"/>
-            </a:avLst>
-          </a:prstGeom>
-          <a:ln w="19050">
-            <a:prstDash val="sysDot"/>
-            <a:headEnd type="none" w="med" len="med"/>
-            <a:tailEnd type="arrow" w="med" len="med"/>
-          </a:ln>
-          <a:effectLst/>
-        </p:spPr>
-        <p:style>
-          <a:lnRef idx="1">
-            <a:schemeClr val="accent6"/>
-          </a:lnRef>
-          <a:fillRef idx="2">
-            <a:schemeClr val="accent6"/>
-          </a:fillRef>
-          <a:effectRef idx="1">
-            <a:schemeClr val="accent6"/>
-          </a:effectRef>
-          <a:fontRef idx="minor">
-            <a:schemeClr val="dk1"/>
-          </a:fontRef>
-        </p:style>
-      </p:cxnSp>
-      <p:sp>
-        <p:nvSpPr>
           <p:cNvPr id="26" name="Rectangle 8">
             <a:extLst>
               <a:ext uri="{FF2B5EF4-FFF2-40B4-BE49-F238E27FC236}">
@@ -4815,7 +4546,7 @@
         </p:nvSpPr>
         <p:spPr>
           <a:xfrm>
-            <a:off x="5446179" y="3849419"/>
+            <a:off x="5530256" y="3151012"/>
             <a:ext cx="1506894" cy="445484"/>
           </a:xfrm>
           <a:prstGeom prst="rect">
@@ -4899,9 +4630,9 @@
           <p:nvPr/>
         </p:nvCxnSpPr>
         <p:spPr>
-          <a:xfrm>
-            <a:off x="5128535" y="3379038"/>
-            <a:ext cx="317644" cy="693123"/>
+          <a:xfrm flipV="1">
+            <a:off x="5128535" y="3373754"/>
+            <a:ext cx="401721" cy="5284"/>
           </a:xfrm>
           <a:prstGeom prst="bentConnector3">
             <a:avLst>
@@ -4949,7 +4680,7 @@
         </p:nvSpPr>
         <p:spPr>
           <a:xfrm>
-            <a:off x="7427082" y="3898781"/>
+            <a:off x="7347181" y="3197816"/>
             <a:ext cx="1259718" cy="346760"/>
           </a:xfrm>
           <a:prstGeom prst="rect">
@@ -5014,9 +4745,9 @@
           <p:nvPr/>
         </p:nvCxnSpPr>
         <p:spPr>
-          <a:xfrm>
-            <a:off x="6953073" y="4072161"/>
-            <a:ext cx="474009" cy="12700"/>
+          <a:xfrm flipV="1">
+            <a:off x="7037150" y="3371196"/>
+            <a:ext cx="310031" cy="2558"/>
           </a:xfrm>
           <a:prstGeom prst="bentConnector3">
             <a:avLst>
@@ -5059,7 +4790,7 @@
         </p:nvSpPr>
         <p:spPr>
           <a:xfrm>
-            <a:off x="5446179" y="4468283"/>
+            <a:off x="5526307" y="3782809"/>
             <a:ext cx="1640422" cy="445484"/>
           </a:xfrm>
           <a:prstGeom prst="rect">
@@ -5140,7 +4871,7 @@
         </p:nvSpPr>
         <p:spPr>
           <a:xfrm>
-            <a:off x="7427082" y="4517645"/>
+            <a:off x="7350882" y="3829367"/>
             <a:ext cx="1412118" cy="346760"/>
           </a:xfrm>
           <a:prstGeom prst="rect">
@@ -5199,14 +4930,15 @@
           </p:cNvPr>
           <p:cNvCxnSpPr>
             <a:cxnSpLocks/>
+            <a:stCxn id="47" idx="3"/>
             <a:endCxn id="48" idx="1"/>
           </p:cNvCxnSpPr>
           <p:nvPr/>
         </p:nvCxnSpPr>
         <p:spPr>
           <a:xfrm flipV="1">
-            <a:off x="7109440" y="4691025"/>
-            <a:ext cx="317642" cy="2"/>
+            <a:off x="7166729" y="4002747"/>
+            <a:ext cx="184153" cy="2804"/>
           </a:xfrm>
           <a:prstGeom prst="bentConnector3">
             <a:avLst>
@@ -5254,7 +4986,7 @@
         <p:spPr>
           <a:xfrm>
             <a:off x="5128535" y="3379038"/>
-            <a:ext cx="317644" cy="1311987"/>
+            <a:ext cx="397772" cy="626513"/>
           </a:xfrm>
           <a:prstGeom prst="bentConnector3">
             <a:avLst>
@@ -5290,10 +5022,10 @@
       </p:cxnSp>
       <p:sp>
         <p:nvSpPr>
-          <p:cNvPr id="57" name="Rectangle 8">
+          <p:cNvPr id="59" name="Rectangle 8">
             <a:extLst>
               <a:ext uri="{FF2B5EF4-FFF2-40B4-BE49-F238E27FC236}">
-                <a16:creationId xmlns:a16="http://schemas.microsoft.com/office/drawing/2014/main" id="{A5B50AA8-278B-410A-89E1-E1C5F40231D2}"/>
+                <a16:creationId xmlns:a16="http://schemas.microsoft.com/office/drawing/2014/main" id="{204770D9-40D2-40AA-B6ED-29F4E7D3B353}"/>
               </a:ext>
             </a:extLst>
           </p:cNvPr>
@@ -5302,8 +5034,8 @@
         </p:nvSpPr>
         <p:spPr>
           <a:xfrm>
-            <a:off x="5446179" y="5136930"/>
-            <a:ext cx="1640422" cy="445484"/>
+            <a:off x="7487731" y="4396321"/>
+            <a:ext cx="1138420" cy="346760"/>
           </a:xfrm>
           <a:prstGeom prst="rect">
             <a:avLst/>
@@ -5338,26 +5070,7 @@
                   </a:schemeClr>
                 </a:solidFill>
               </a:rPr>
-              <a:t>XmlSerializable</a:t>
-            </a:r>
-            <a:br>
-              <a:rPr lang="en-US" sz="1050" b="1" dirty="0">
-                <a:solidFill>
-                  <a:schemeClr val="accent6">
-                    <a:lumMod val="75000"/>
-                  </a:schemeClr>
-                </a:solidFill>
-              </a:rPr>
-            </a:br>
-            <a:r>
-              <a:rPr lang="en-US" sz="1050" b="1" dirty="0" err="1">
-                <a:solidFill>
-                  <a:schemeClr val="accent6">
-                    <a:lumMod val="75000"/>
-                  </a:schemeClr>
-                </a:solidFill>
-              </a:rPr>
-              <a:t>MakerManagerJobs</a:t>
+              <a:t>XmlAdaptedJob</a:t>
             </a:r>
             <a:endParaRPr lang="en-SG" sz="1050" b="1" dirty="0">
               <a:solidFill>
@@ -5369,27 +5082,37 @@
           </a:p>
         </p:txBody>
       </p:sp>
-      <p:sp>
-        <p:nvSpPr>
-          <p:cNvPr id="59" name="Rectangle 8">
+      <p:cxnSp>
+        <p:nvCxnSpPr>
+          <p:cNvPr id="62" name="Elbow Connector 122">
             <a:extLst>
               <a:ext uri="{FF2B5EF4-FFF2-40B4-BE49-F238E27FC236}">
-                <a16:creationId xmlns:a16="http://schemas.microsoft.com/office/drawing/2014/main" id="{204770D9-40D2-40AA-B6ED-29F4E7D3B353}"/>
+                <a16:creationId xmlns:a16="http://schemas.microsoft.com/office/drawing/2014/main" id="{DDE84706-06F7-4009-B91B-3058E21A75C7}"/>
               </a:ext>
             </a:extLst>
           </p:cNvPr>
-          <p:cNvSpPr/>
+          <p:cNvCxnSpPr>
+            <a:cxnSpLocks/>
+            <a:stCxn id="48" idx="2"/>
+            <a:endCxn id="59" idx="0"/>
+          </p:cNvCxnSpPr>
           <p:nvPr/>
-        </p:nvSpPr>
-        <p:spPr>
-          <a:xfrm>
-            <a:off x="7422377" y="5186292"/>
-            <a:ext cx="1138420" cy="346760"/>
-          </a:xfrm>
-          <a:prstGeom prst="rect">
-            <a:avLst/>
+        </p:nvCxnSpPr>
+        <p:spPr>
+          <a:xfrm rot="5400000">
+            <a:off x="7946844" y="4286224"/>
+            <a:ext cx="220194" cy="12700"/>
+          </a:xfrm>
+          <a:prstGeom prst="bentConnector3">
+            <a:avLst>
+              <a:gd name="adj1" fmla="val 50000"/>
+            </a:avLst>
           </a:prstGeom>
-          <a:ln w="19050"/>
+          <a:ln w="19050">
+            <a:prstDash val="sysDot"/>
+            <a:headEnd type="none" w="med" len="med"/>
+            <a:tailEnd type="arrow" w="med" len="med"/>
+          </a:ln>
           <a:effectLst/>
         </p:spPr>
         <p:style>
@@ -5406,6 +5129,44 @@
             <a:schemeClr val="dk1"/>
           </a:fontRef>
         </p:style>
+      </p:cxnSp>
+      <p:sp>
+        <p:nvSpPr>
+          <p:cNvPr id="38" name="Rectangle 8">
+            <a:extLst>
+              <a:ext uri="{FF2B5EF4-FFF2-40B4-BE49-F238E27FC236}">
+                <a16:creationId xmlns:a16="http://schemas.microsoft.com/office/drawing/2014/main" id="{A2CD1439-CACA-4473-9070-601A5F375B7E}"/>
+              </a:ext>
+            </a:extLst>
+          </p:cNvPr>
+          <p:cNvSpPr/>
+          <p:nvPr/>
+        </p:nvSpPr>
+        <p:spPr>
+          <a:xfrm>
+            <a:off x="2139793" y="5260714"/>
+            <a:ext cx="1416822" cy="346760"/>
+          </a:xfrm>
+          <a:prstGeom prst="rect">
+            <a:avLst/>
+          </a:prstGeom>
+          <a:ln w="19050"/>
+          <a:effectLst/>
+        </p:spPr>
+        <p:style>
+          <a:lnRef idx="1">
+            <a:schemeClr val="accent6"/>
+          </a:lnRef>
+          <a:fillRef idx="2">
+            <a:schemeClr val="accent6"/>
+          </a:fillRef>
+          <a:effectRef idx="1">
+            <a:schemeClr val="accent6"/>
+          </a:effectRef>
+          <a:fontRef idx="minor">
+            <a:schemeClr val="dk1"/>
+          </a:fontRef>
+        </p:style>
         <p:txBody>
           <a:bodyPr rtlCol="0" anchor="ctr"/>
           <a:lstStyle/>
@@ -5419,7 +5180,7 @@
                   </a:schemeClr>
                 </a:solidFill>
               </a:rPr>
-              <a:t>XmlAdaptedJob</a:t>
+              <a:t>XmlAdaptedJobName</a:t>
             </a:r>
             <a:endParaRPr lang="en-SG" sz="1050" b="1" dirty="0">
               <a:solidFill>
@@ -5433,24 +5194,490 @@
       </p:sp>
       <p:cxnSp>
         <p:nvCxnSpPr>
-          <p:cNvPr id="62" name="Elbow Connector 122">
+          <p:cNvPr id="39" name="Elbow Connector 122">
             <a:extLst>
               <a:ext uri="{FF2B5EF4-FFF2-40B4-BE49-F238E27FC236}">
-                <a16:creationId xmlns:a16="http://schemas.microsoft.com/office/drawing/2014/main" id="{DDE84706-06F7-4009-B91B-3058E21A75C7}"/>
+                <a16:creationId xmlns:a16="http://schemas.microsoft.com/office/drawing/2014/main" id="{0A978C57-E798-4AAB-883B-B823CEE98720}"/>
               </a:ext>
             </a:extLst>
           </p:cNvPr>
           <p:cNvCxnSpPr>
             <a:cxnSpLocks/>
-            <a:stCxn id="57" idx="3"/>
-            <a:endCxn id="59" idx="1"/>
+            <a:stCxn id="59" idx="2"/>
+            <a:endCxn id="38" idx="0"/>
           </p:cNvCxnSpPr>
           <p:nvPr/>
         </p:nvCxnSpPr>
         <p:spPr>
+          <a:xfrm rot="5400000">
+            <a:off x="5193757" y="2397529"/>
+            <a:ext cx="517633" cy="5208737"/>
+          </a:xfrm>
+          <a:prstGeom prst="bentConnector3">
+            <a:avLst>
+              <a:gd name="adj1" fmla="val 50000"/>
+            </a:avLst>
+          </a:prstGeom>
+          <a:ln w="19050">
+            <a:prstDash val="sysDot"/>
+            <a:headEnd type="none" w="med" len="med"/>
+            <a:tailEnd type="arrow" w="med" len="med"/>
+          </a:ln>
+          <a:effectLst/>
+        </p:spPr>
+        <p:style>
+          <a:lnRef idx="1">
+            <a:schemeClr val="accent6"/>
+          </a:lnRef>
+          <a:fillRef idx="2">
+            <a:schemeClr val="accent6"/>
+          </a:fillRef>
+          <a:effectRef idx="1">
+            <a:schemeClr val="accent6"/>
+          </a:effectRef>
+          <a:fontRef idx="minor">
+            <a:schemeClr val="dk1"/>
+          </a:fontRef>
+        </p:style>
+      </p:cxnSp>
+      <p:sp>
+        <p:nvSpPr>
+          <p:cNvPr id="44" name="Rectangle 8">
+            <a:extLst>
+              <a:ext uri="{FF2B5EF4-FFF2-40B4-BE49-F238E27FC236}">
+                <a16:creationId xmlns:a16="http://schemas.microsoft.com/office/drawing/2014/main" id="{0472788E-81DD-4C7C-8A0D-05322B4D804A}"/>
+              </a:ext>
+            </a:extLst>
+          </p:cNvPr>
+          <p:cNvSpPr/>
+          <p:nvPr/>
+        </p:nvSpPr>
+        <p:spPr>
           <a:xfrm>
-            <a:off x="7086601" y="5359672"/>
-            <a:ext cx="335776" cy="12700"/>
+            <a:off x="1199213" y="4090556"/>
+            <a:ext cx="737804" cy="204347"/>
+          </a:xfrm>
+          <a:prstGeom prst="rect">
+            <a:avLst/>
+          </a:prstGeom>
+          <a:solidFill>
+            <a:schemeClr val="accent6">
+              <a:lumMod val="75000"/>
+            </a:schemeClr>
+          </a:solidFill>
+          <a:ln w="19050">
+            <a:solidFill>
+              <a:schemeClr val="accent6">
+                <a:lumMod val="75000"/>
+              </a:schemeClr>
+            </a:solidFill>
+          </a:ln>
+          <a:effectLst/>
+        </p:spPr>
+        <p:style>
+          <a:lnRef idx="1">
+            <a:schemeClr val="accent2"/>
+          </a:lnRef>
+          <a:fillRef idx="2">
+            <a:schemeClr val="accent2"/>
+          </a:fillRef>
+          <a:effectRef idx="1">
+            <a:schemeClr val="accent2"/>
+          </a:effectRef>
+          <a:fontRef idx="minor">
+            <a:schemeClr val="dk1"/>
+          </a:fontRef>
+        </p:style>
+        <p:txBody>
+          <a:bodyPr rtlCol="0" anchor="ctr"/>
+          <a:lstStyle/>
+          <a:p>
+            <a:pPr algn="ctr"/>
+            <a:r>
+              <a:rPr lang="en-US" sz="1050" dirty="0" err="1">
+                <a:solidFill>
+                  <a:schemeClr val="bg1"/>
+                </a:solidFill>
+              </a:rPr>
+              <a:t>UserPref</a:t>
+            </a:r>
+            <a:endParaRPr lang="en-SG" sz="1050" dirty="0">
+              <a:solidFill>
+                <a:schemeClr val="bg1"/>
+              </a:solidFill>
+            </a:endParaRPr>
+          </a:p>
+        </p:txBody>
+      </p:sp>
+      <p:sp>
+        <p:nvSpPr>
+          <p:cNvPr id="46" name="Flowchart: Decision 96">
+            <a:extLst>
+              <a:ext uri="{FF2B5EF4-FFF2-40B4-BE49-F238E27FC236}">
+                <a16:creationId xmlns:a16="http://schemas.microsoft.com/office/drawing/2014/main" id="{162C2D67-E4A4-40F1-B8C2-96DEB379057D}"/>
+              </a:ext>
+            </a:extLst>
+          </p:cNvPr>
+          <p:cNvSpPr/>
+          <p:nvPr/>
+        </p:nvSpPr>
+        <p:spPr>
+          <a:xfrm rot="5400000">
+            <a:off x="1455905" y="3669986"/>
+            <a:ext cx="236048" cy="173380"/>
+          </a:xfrm>
+          <a:prstGeom prst="flowChartDecision">
+            <a:avLst/>
+          </a:prstGeom>
+          <a:noFill/>
+          <a:ln w="19050">
+            <a:solidFill>
+              <a:schemeClr val="accent6">
+                <a:lumMod val="75000"/>
+              </a:schemeClr>
+            </a:solidFill>
+          </a:ln>
+          <a:effectLst/>
+        </p:spPr>
+        <p:style>
+          <a:lnRef idx="1">
+            <a:schemeClr val="accent2"/>
+          </a:lnRef>
+          <a:fillRef idx="2">
+            <a:schemeClr val="accent2"/>
+          </a:fillRef>
+          <a:effectRef idx="1">
+            <a:schemeClr val="accent2"/>
+          </a:effectRef>
+          <a:fontRef idx="minor">
+            <a:schemeClr val="dk1"/>
+          </a:fontRef>
+        </p:style>
+        <p:txBody>
+          <a:bodyPr rtlCol="0" anchor="ctr"/>
+          <a:lstStyle/>
+          <a:p>
+            <a:pPr algn="ctr"/>
+            <a:endParaRPr lang="en-US" sz="1050">
+              <a:solidFill>
+                <a:schemeClr val="bg1"/>
+              </a:solidFill>
+            </a:endParaRPr>
+          </a:p>
+        </p:txBody>
+      </p:sp>
+      <p:cxnSp>
+        <p:nvCxnSpPr>
+          <p:cNvPr id="51" name="Straight Arrow Connector 50">
+            <a:extLst>
+              <a:ext uri="{FF2B5EF4-FFF2-40B4-BE49-F238E27FC236}">
+                <a16:creationId xmlns:a16="http://schemas.microsoft.com/office/drawing/2014/main" id="{77D7EFAC-21F1-4843-A878-9D88B201BB17}"/>
+              </a:ext>
+            </a:extLst>
+          </p:cNvPr>
+          <p:cNvCxnSpPr>
+            <a:cxnSpLocks/>
+          </p:cNvCxnSpPr>
+          <p:nvPr/>
+        </p:nvCxnSpPr>
+        <p:spPr>
+          <a:xfrm>
+            <a:off x="1568115" y="3880515"/>
+            <a:ext cx="1" cy="204346"/>
+          </a:xfrm>
+          <a:prstGeom prst="straightConnector1">
+            <a:avLst/>
+          </a:prstGeom>
+          <a:ln w="19050">
+            <a:solidFill>
+              <a:schemeClr val="accent6">
+                <a:lumMod val="75000"/>
+              </a:schemeClr>
+            </a:solidFill>
+            <a:headEnd type="none" w="med" len="med"/>
+            <a:tailEnd type="arrow" w="med" len="med"/>
+          </a:ln>
+          <a:effectLst/>
+        </p:spPr>
+        <p:style>
+          <a:lnRef idx="1">
+            <a:schemeClr val="accent2"/>
+          </a:lnRef>
+          <a:fillRef idx="2">
+            <a:schemeClr val="accent2"/>
+          </a:fillRef>
+          <a:effectRef idx="1">
+            <a:schemeClr val="accent2"/>
+          </a:effectRef>
+          <a:fontRef idx="minor">
+            <a:schemeClr val="dk1"/>
+          </a:fontRef>
+        </p:style>
+      </p:cxnSp>
+      <p:sp>
+        <p:nvSpPr>
+          <p:cNvPr id="37" name="Rectangle 8">
+            <a:extLst>
+              <a:ext uri="{FF2B5EF4-FFF2-40B4-BE49-F238E27FC236}">
+                <a16:creationId xmlns:a16="http://schemas.microsoft.com/office/drawing/2014/main" id="{0AD248DB-2F6C-40B1-AFDB-92D704A56364}"/>
+              </a:ext>
+            </a:extLst>
+          </p:cNvPr>
+          <p:cNvSpPr/>
+          <p:nvPr/>
+        </p:nvSpPr>
+        <p:spPr>
+          <a:xfrm>
+            <a:off x="3745193" y="5254365"/>
+            <a:ext cx="1560793" cy="346760"/>
+          </a:xfrm>
+          <a:prstGeom prst="rect">
+            <a:avLst/>
+          </a:prstGeom>
+          <a:ln w="19050"/>
+          <a:effectLst/>
+        </p:spPr>
+        <p:style>
+          <a:lnRef idx="1">
+            <a:schemeClr val="accent6"/>
+          </a:lnRef>
+          <a:fillRef idx="2">
+            <a:schemeClr val="accent6"/>
+          </a:fillRef>
+          <a:effectRef idx="1">
+            <a:schemeClr val="accent6"/>
+          </a:effectRef>
+          <a:fontRef idx="minor">
+            <a:schemeClr val="dk1"/>
+          </a:fontRef>
+        </p:style>
+        <p:txBody>
+          <a:bodyPr rtlCol="0" anchor="ctr"/>
+          <a:lstStyle/>
+          <a:p>
+            <a:pPr algn="ctr"/>
+            <a:r>
+              <a:rPr lang="en-US" sz="1050" b="1" dirty="0" err="1">
+                <a:solidFill>
+                  <a:schemeClr val="accent6">
+                    <a:lumMod val="75000"/>
+                  </a:schemeClr>
+                </a:solidFill>
+              </a:rPr>
+              <a:t>XmlAdaptedJobOwner</a:t>
+            </a:r>
+            <a:endParaRPr lang="en-SG" sz="1050" b="1" dirty="0">
+              <a:solidFill>
+                <a:schemeClr val="accent6">
+                  <a:lumMod val="75000"/>
+                </a:schemeClr>
+              </a:solidFill>
+            </a:endParaRPr>
+          </a:p>
+        </p:txBody>
+      </p:sp>
+      <p:cxnSp>
+        <p:nvCxnSpPr>
+          <p:cNvPr id="40" name="Elbow Connector 122">
+            <a:extLst>
+              <a:ext uri="{FF2B5EF4-FFF2-40B4-BE49-F238E27FC236}">
+                <a16:creationId xmlns:a16="http://schemas.microsoft.com/office/drawing/2014/main" id="{1550D059-2278-4AE1-836E-A395F2DDEBA4}"/>
+              </a:ext>
+            </a:extLst>
+          </p:cNvPr>
+          <p:cNvCxnSpPr>
+            <a:cxnSpLocks/>
+            <a:stCxn id="59" idx="2"/>
+            <a:endCxn id="37" idx="0"/>
+          </p:cNvCxnSpPr>
+          <p:nvPr/>
+        </p:nvCxnSpPr>
+        <p:spPr>
+          <a:xfrm rot="5400000">
+            <a:off x="6035624" y="3233048"/>
+            <a:ext cx="511284" cy="3531351"/>
+          </a:xfrm>
+          <a:prstGeom prst="bentConnector3">
+            <a:avLst>
+              <a:gd name="adj1" fmla="val 50000"/>
+            </a:avLst>
+          </a:prstGeom>
+          <a:ln w="19050">
+            <a:prstDash val="sysDot"/>
+            <a:headEnd type="none" w="med" len="med"/>
+            <a:tailEnd type="arrow" w="med" len="med"/>
+          </a:ln>
+          <a:effectLst/>
+        </p:spPr>
+        <p:style>
+          <a:lnRef idx="1">
+            <a:schemeClr val="accent6"/>
+          </a:lnRef>
+          <a:fillRef idx="2">
+            <a:schemeClr val="accent6"/>
+          </a:fillRef>
+          <a:effectRef idx="1">
+            <a:schemeClr val="accent6"/>
+          </a:effectRef>
+          <a:fontRef idx="minor">
+            <a:schemeClr val="dk1"/>
+          </a:fontRef>
+        </p:style>
+      </p:cxnSp>
+      <p:sp>
+        <p:nvSpPr>
+          <p:cNvPr id="53" name="Rectangle 8">
+            <a:extLst>
+              <a:ext uri="{FF2B5EF4-FFF2-40B4-BE49-F238E27FC236}">
+                <a16:creationId xmlns:a16="http://schemas.microsoft.com/office/drawing/2014/main" id="{50E4D84D-DD9B-435A-8102-DD45508EE6E8}"/>
+              </a:ext>
+            </a:extLst>
+          </p:cNvPr>
+          <p:cNvSpPr/>
+          <p:nvPr/>
+        </p:nvSpPr>
+        <p:spPr>
+          <a:xfrm>
+            <a:off x="5468448" y="5245576"/>
+            <a:ext cx="1560793" cy="346760"/>
+          </a:xfrm>
+          <a:prstGeom prst="rect">
+            <a:avLst/>
+          </a:prstGeom>
+          <a:ln w="19050"/>
+          <a:effectLst/>
+        </p:spPr>
+        <p:style>
+          <a:lnRef idx="1">
+            <a:schemeClr val="accent6"/>
+          </a:lnRef>
+          <a:fillRef idx="2">
+            <a:schemeClr val="accent6"/>
+          </a:fillRef>
+          <a:effectRef idx="1">
+            <a:schemeClr val="accent6"/>
+          </a:effectRef>
+          <a:fontRef idx="minor">
+            <a:schemeClr val="dk1"/>
+          </a:fontRef>
+        </p:style>
+        <p:txBody>
+          <a:bodyPr rtlCol="0" anchor="ctr"/>
+          <a:lstStyle/>
+          <a:p>
+            <a:pPr algn="ctr"/>
+            <a:r>
+              <a:rPr lang="en-US" sz="1050" b="1" dirty="0" err="1">
+                <a:solidFill>
+                  <a:schemeClr val="accent6">
+                    <a:lumMod val="75000"/>
+                  </a:schemeClr>
+                </a:solidFill>
+              </a:rPr>
+              <a:t>XmlAdaptedTimeStamp</a:t>
+            </a:r>
+            <a:r>
+              <a:rPr lang="en-US" sz="1050" b="1" dirty="0">
+                <a:solidFill>
+                  <a:schemeClr val="accent6">
+                    <a:lumMod val="75000"/>
+                  </a:schemeClr>
+                </a:solidFill>
+              </a:rPr>
+              <a:t> </a:t>
+            </a:r>
+            <a:endParaRPr lang="en-SG" sz="1050" b="1" dirty="0">
+              <a:solidFill>
+                <a:schemeClr val="accent6">
+                  <a:lumMod val="75000"/>
+                </a:schemeClr>
+              </a:solidFill>
+            </a:endParaRPr>
+          </a:p>
+        </p:txBody>
+      </p:sp>
+      <p:sp>
+        <p:nvSpPr>
+          <p:cNvPr id="57" name="Rectangle 8">
+            <a:extLst>
+              <a:ext uri="{FF2B5EF4-FFF2-40B4-BE49-F238E27FC236}">
+                <a16:creationId xmlns:a16="http://schemas.microsoft.com/office/drawing/2014/main" id="{947B4741-9D04-4B7C-86A8-779759C4823A}"/>
+              </a:ext>
+            </a:extLst>
+          </p:cNvPr>
+          <p:cNvSpPr/>
+          <p:nvPr/>
+        </p:nvSpPr>
+        <p:spPr>
+          <a:xfrm>
+            <a:off x="7374040" y="5260714"/>
+            <a:ext cx="1343256" cy="346760"/>
+          </a:xfrm>
+          <a:prstGeom prst="rect">
+            <a:avLst/>
+          </a:prstGeom>
+          <a:ln w="19050"/>
+          <a:effectLst/>
+        </p:spPr>
+        <p:style>
+          <a:lnRef idx="1">
+            <a:schemeClr val="accent6"/>
+          </a:lnRef>
+          <a:fillRef idx="2">
+            <a:schemeClr val="accent6"/>
+          </a:fillRef>
+          <a:effectRef idx="1">
+            <a:schemeClr val="accent6"/>
+          </a:effectRef>
+          <a:fontRef idx="minor">
+            <a:schemeClr val="dk1"/>
+          </a:fontRef>
+        </p:style>
+        <p:txBody>
+          <a:bodyPr rtlCol="0" anchor="ctr"/>
+          <a:lstStyle/>
+          <a:p>
+            <a:pPr algn="ctr"/>
+            <a:r>
+              <a:rPr lang="en-US" sz="1050" b="1" dirty="0" err="1">
+                <a:solidFill>
+                  <a:schemeClr val="accent6">
+                    <a:lumMod val="75000"/>
+                  </a:schemeClr>
+                </a:solidFill>
+              </a:rPr>
+              <a:t>XmlAdaptedTag</a:t>
+            </a:r>
+            <a:endParaRPr lang="en-SG" sz="1050" b="1" dirty="0">
+              <a:solidFill>
+                <a:schemeClr val="accent6">
+                  <a:lumMod val="75000"/>
+                </a:schemeClr>
+              </a:solidFill>
+            </a:endParaRPr>
+          </a:p>
+        </p:txBody>
+      </p:sp>
+      <p:cxnSp>
+        <p:nvCxnSpPr>
+          <p:cNvPr id="63" name="Elbow Connector 122">
+            <a:extLst>
+              <a:ext uri="{FF2B5EF4-FFF2-40B4-BE49-F238E27FC236}">
+                <a16:creationId xmlns:a16="http://schemas.microsoft.com/office/drawing/2014/main" id="{603EC58B-146C-4E7B-AD21-ED2A4986A434}"/>
+              </a:ext>
+            </a:extLst>
+          </p:cNvPr>
+          <p:cNvCxnSpPr>
+            <a:cxnSpLocks/>
+            <a:stCxn id="59" idx="2"/>
+            <a:endCxn id="53" idx="0"/>
+          </p:cNvCxnSpPr>
+          <p:nvPr/>
+        </p:nvCxnSpPr>
+        <p:spPr>
+          <a:xfrm rot="5400000">
+            <a:off x="6901646" y="4090280"/>
+            <a:ext cx="502495" cy="1808096"/>
           </a:xfrm>
           <a:prstGeom prst="bentConnector3">
             <a:avLst>
@@ -5481,136 +5708,24 @@
       </p:cxnSp>
       <p:cxnSp>
         <p:nvCxnSpPr>
-          <p:cNvPr id="71" name="Elbow Connector 122">
+          <p:cNvPr id="64" name="Elbow Connector 122">
             <a:extLst>
               <a:ext uri="{FF2B5EF4-FFF2-40B4-BE49-F238E27FC236}">
-                <a16:creationId xmlns:a16="http://schemas.microsoft.com/office/drawing/2014/main" id="{8A1EB3CE-3C7E-4D3F-BE53-5E13E914751D}"/>
-              </a:ext>
-            </a:extLst>
-          </p:cNvPr>
-          <p:cNvCxnSpPr>
-            <a:cxnSpLocks/>
-            <a:endCxn id="57" idx="1"/>
-          </p:cNvCxnSpPr>
-          <p:nvPr/>
-        </p:nvCxnSpPr>
-        <p:spPr>
-          <a:xfrm rot="16200000" flipH="1">
-            <a:off x="4294051" y="4207544"/>
-            <a:ext cx="2001176" cy="303079"/>
-          </a:xfrm>
-          <a:prstGeom prst="bentConnector2">
-            <a:avLst/>
-          </a:prstGeom>
-          <a:ln w="19050">
-            <a:solidFill>
-              <a:schemeClr val="accent6">
-                <a:lumMod val="75000"/>
-              </a:schemeClr>
-            </a:solidFill>
-            <a:prstDash val="sysDot"/>
-            <a:headEnd type="none" w="med" len="med"/>
-            <a:tailEnd type="arrow" w="med" len="med"/>
-          </a:ln>
-          <a:effectLst/>
-        </p:spPr>
-        <p:style>
-          <a:lnRef idx="1">
-            <a:schemeClr val="accent2"/>
-          </a:lnRef>
-          <a:fillRef idx="2">
-            <a:schemeClr val="accent2"/>
-          </a:fillRef>
-          <a:effectRef idx="1">
-            <a:schemeClr val="accent2"/>
-          </a:effectRef>
-          <a:fontRef idx="minor">
-            <a:schemeClr val="dk1"/>
-          </a:fontRef>
-        </p:style>
-      </p:cxnSp>
-      <p:sp>
-        <p:nvSpPr>
-          <p:cNvPr id="38" name="Rectangle 8">
-            <a:extLst>
-              <a:ext uri="{FF2B5EF4-FFF2-40B4-BE49-F238E27FC236}">
-                <a16:creationId xmlns:a16="http://schemas.microsoft.com/office/drawing/2014/main" id="{A2CD1439-CACA-4473-9070-601A5F375B7E}"/>
-              </a:ext>
-            </a:extLst>
-          </p:cNvPr>
-          <p:cNvSpPr/>
-          <p:nvPr/>
-        </p:nvSpPr>
-        <p:spPr>
-          <a:xfrm>
-            <a:off x="7190077" y="5879617"/>
-            <a:ext cx="1416822" cy="346760"/>
-          </a:xfrm>
-          <a:prstGeom prst="rect">
-            <a:avLst/>
-          </a:prstGeom>
-          <a:ln w="19050"/>
-          <a:effectLst/>
-        </p:spPr>
-        <p:style>
-          <a:lnRef idx="1">
-            <a:schemeClr val="accent6"/>
-          </a:lnRef>
-          <a:fillRef idx="2">
-            <a:schemeClr val="accent6"/>
-          </a:fillRef>
-          <a:effectRef idx="1">
-            <a:schemeClr val="accent6"/>
-          </a:effectRef>
-          <a:fontRef idx="minor">
-            <a:schemeClr val="dk1"/>
-          </a:fontRef>
-        </p:style>
-        <p:txBody>
-          <a:bodyPr rtlCol="0" anchor="ctr"/>
-          <a:lstStyle/>
-          <a:p>
-            <a:pPr algn="ctr"/>
-            <a:r>
-              <a:rPr lang="en-US" sz="1050" b="1" dirty="0" err="1">
-                <a:solidFill>
-                  <a:schemeClr val="accent6">
-                    <a:lumMod val="75000"/>
-                  </a:schemeClr>
-                </a:solidFill>
-              </a:rPr>
-              <a:t>XmlAdaptedJobName</a:t>
-            </a:r>
-            <a:endParaRPr lang="en-SG" sz="1050" b="1" dirty="0">
-              <a:solidFill>
-                <a:schemeClr val="accent6">
-                  <a:lumMod val="75000"/>
-                </a:schemeClr>
-              </a:solidFill>
-            </a:endParaRPr>
-          </a:p>
-        </p:txBody>
-      </p:sp>
-      <p:cxnSp>
-        <p:nvCxnSpPr>
-          <p:cNvPr id="39" name="Elbow Connector 122">
-            <a:extLst>
-              <a:ext uri="{FF2B5EF4-FFF2-40B4-BE49-F238E27FC236}">
-                <a16:creationId xmlns:a16="http://schemas.microsoft.com/office/drawing/2014/main" id="{0A978C57-E798-4AAB-883B-B823CEE98720}"/>
+                <a16:creationId xmlns:a16="http://schemas.microsoft.com/office/drawing/2014/main" id="{E51ED4A9-1609-4D65-85EB-59612FA339D4}"/>
               </a:ext>
             </a:extLst>
           </p:cNvPr>
           <p:cNvCxnSpPr>
             <a:cxnSpLocks/>
             <a:stCxn id="59" idx="2"/>
-            <a:endCxn id="38" idx="0"/>
+            <a:endCxn id="57" idx="0"/>
           </p:cNvCxnSpPr>
           <p:nvPr/>
         </p:nvCxnSpPr>
         <p:spPr>
           <a:xfrm rot="5400000">
-            <a:off x="7771756" y="5659785"/>
-            <a:ext cx="346565" cy="93099"/>
+            <a:off x="7792489" y="4996261"/>
+            <a:ext cx="517633" cy="11273"/>
           </a:xfrm>
           <a:prstGeom prst="bentConnector3">
             <a:avLst>
@@ -5633,180 +5748,6 @@
           </a:fillRef>
           <a:effectRef idx="1">
             <a:schemeClr val="accent6"/>
-          </a:effectRef>
-          <a:fontRef idx="minor">
-            <a:schemeClr val="dk1"/>
-          </a:fontRef>
-        </p:style>
-      </p:cxnSp>
-      <p:sp>
-        <p:nvSpPr>
-          <p:cNvPr id="44" name="Rectangle 8">
-            <a:extLst>
-              <a:ext uri="{FF2B5EF4-FFF2-40B4-BE49-F238E27FC236}">
-                <a16:creationId xmlns:a16="http://schemas.microsoft.com/office/drawing/2014/main" id="{0472788E-81DD-4C7C-8A0D-05322B4D804A}"/>
-              </a:ext>
-            </a:extLst>
-          </p:cNvPr>
-          <p:cNvSpPr/>
-          <p:nvPr/>
-        </p:nvSpPr>
-        <p:spPr>
-          <a:xfrm>
-            <a:off x="1199213" y="4090556"/>
-            <a:ext cx="737804" cy="204347"/>
-          </a:xfrm>
-          <a:prstGeom prst="rect">
-            <a:avLst/>
-          </a:prstGeom>
-          <a:solidFill>
-            <a:schemeClr val="accent6">
-              <a:lumMod val="75000"/>
-            </a:schemeClr>
-          </a:solidFill>
-          <a:ln w="19050">
-            <a:solidFill>
-              <a:schemeClr val="accent6">
-                <a:lumMod val="75000"/>
-              </a:schemeClr>
-            </a:solidFill>
-          </a:ln>
-          <a:effectLst/>
-        </p:spPr>
-        <p:style>
-          <a:lnRef idx="1">
-            <a:schemeClr val="accent2"/>
-          </a:lnRef>
-          <a:fillRef idx="2">
-            <a:schemeClr val="accent2"/>
-          </a:fillRef>
-          <a:effectRef idx="1">
-            <a:schemeClr val="accent2"/>
-          </a:effectRef>
-          <a:fontRef idx="minor">
-            <a:schemeClr val="dk1"/>
-          </a:fontRef>
-        </p:style>
-        <p:txBody>
-          <a:bodyPr rtlCol="0" anchor="ctr"/>
-          <a:lstStyle/>
-          <a:p>
-            <a:pPr algn="ctr"/>
-            <a:r>
-              <a:rPr lang="en-US" sz="1050" dirty="0" err="1">
-                <a:solidFill>
-                  <a:schemeClr val="bg1"/>
-                </a:solidFill>
-              </a:rPr>
-              <a:t>UserPref</a:t>
-            </a:r>
-            <a:endParaRPr lang="en-SG" sz="1050" dirty="0">
-              <a:solidFill>
-                <a:schemeClr val="bg1"/>
-              </a:solidFill>
-            </a:endParaRPr>
-          </a:p>
-        </p:txBody>
-      </p:sp>
-      <p:sp>
-        <p:nvSpPr>
-          <p:cNvPr id="46" name="Flowchart: Decision 96">
-            <a:extLst>
-              <a:ext uri="{FF2B5EF4-FFF2-40B4-BE49-F238E27FC236}">
-                <a16:creationId xmlns:a16="http://schemas.microsoft.com/office/drawing/2014/main" id="{162C2D67-E4A4-40F1-B8C2-96DEB379057D}"/>
-              </a:ext>
-            </a:extLst>
-          </p:cNvPr>
-          <p:cNvSpPr/>
-          <p:nvPr/>
-        </p:nvSpPr>
-        <p:spPr>
-          <a:xfrm rot="5400000">
-            <a:off x="1455905" y="3669986"/>
-            <a:ext cx="236048" cy="173380"/>
-          </a:xfrm>
-          <a:prstGeom prst="flowChartDecision">
-            <a:avLst/>
-          </a:prstGeom>
-          <a:noFill/>
-          <a:ln w="19050">
-            <a:solidFill>
-              <a:schemeClr val="accent6">
-                <a:lumMod val="75000"/>
-              </a:schemeClr>
-            </a:solidFill>
-          </a:ln>
-          <a:effectLst/>
-        </p:spPr>
-        <p:style>
-          <a:lnRef idx="1">
-            <a:schemeClr val="accent2"/>
-          </a:lnRef>
-          <a:fillRef idx="2">
-            <a:schemeClr val="accent2"/>
-          </a:fillRef>
-          <a:effectRef idx="1">
-            <a:schemeClr val="accent2"/>
-          </a:effectRef>
-          <a:fontRef idx="minor">
-            <a:schemeClr val="dk1"/>
-          </a:fontRef>
-        </p:style>
-        <p:txBody>
-          <a:bodyPr rtlCol="0" anchor="ctr"/>
-          <a:lstStyle/>
-          <a:p>
-            <a:pPr algn="ctr"/>
-            <a:endParaRPr lang="en-US" sz="1050">
-              <a:solidFill>
-                <a:schemeClr val="bg1"/>
-              </a:solidFill>
-            </a:endParaRPr>
-          </a:p>
-        </p:txBody>
-      </p:sp>
-      <p:cxnSp>
-        <p:nvCxnSpPr>
-          <p:cNvPr id="51" name="Straight Arrow Connector 50">
-            <a:extLst>
-              <a:ext uri="{FF2B5EF4-FFF2-40B4-BE49-F238E27FC236}">
-                <a16:creationId xmlns:a16="http://schemas.microsoft.com/office/drawing/2014/main" id="{77D7EFAC-21F1-4843-A878-9D88B201BB17}"/>
-              </a:ext>
-            </a:extLst>
-          </p:cNvPr>
-          <p:cNvCxnSpPr>
-            <a:cxnSpLocks/>
-          </p:cNvCxnSpPr>
-          <p:nvPr/>
-        </p:nvCxnSpPr>
-        <p:spPr>
-          <a:xfrm>
-            <a:off x="1568115" y="3880515"/>
-            <a:ext cx="1" cy="204346"/>
-          </a:xfrm>
-          <a:prstGeom prst="straightConnector1">
-            <a:avLst/>
-          </a:prstGeom>
-          <a:ln w="19050">
-            <a:solidFill>
-              <a:schemeClr val="accent6">
-                <a:lumMod val="75000"/>
-              </a:schemeClr>
-            </a:solidFill>
-            <a:headEnd type="none" w="med" len="med"/>
-            <a:tailEnd type="arrow" w="med" len="med"/>
-          </a:ln>
-          <a:effectLst/>
-        </p:spPr>
-        <p:style>
-          <a:lnRef idx="1">
-            <a:schemeClr val="accent2"/>
-          </a:lnRef>
-          <a:fillRef idx="2">
-            <a:schemeClr val="accent2"/>
-          </a:fillRef>
-          <a:effectRef idx="1">
-            <a:schemeClr val="accent2"/>
           </a:effectRef>
           <a:fontRef idx="minor">
             <a:schemeClr val="dk1"/>

</xml_diff>

<commit_message>
Added my own feature : storage system for maker manager (jun jie feature) to be used in my own ppp
</commit_message>
<xml_diff>
--- a/docs/diagrams/StorageComponentClassDiagram.pptx
+++ b/docs/diagrams/StorageComponentClassDiagram.pptx
@@ -5,10 +5,11 @@
     <p:sldMasterId id="2147483648" r:id="rId1"/>
   </p:sldMasterIdLst>
   <p:notesMasterIdLst>
-    <p:notesMasterId r:id="rId3"/>
+    <p:notesMasterId r:id="rId4"/>
   </p:notesMasterIdLst>
   <p:sldIdLst>
     <p:sldId id="264" r:id="rId2"/>
+    <p:sldId id="265" r:id="rId3"/>
   </p:sldIdLst>
   <p:sldSz cx="9144000" cy="6858000" type="screen4x3"/>
   <p:notesSz cx="6858000" cy="9144000"/>
@@ -208,7 +209,7 @@
           <a:p>
             <a:fld id="{F5CC4B3F-88C1-4FFA-B1B6-F41C21DC6924}" type="datetimeFigureOut">
               <a:rPr lang="en-US" smtClean="0"/>
-              <a:t>11/8/18</a:t>
+              <a:t>11/8/2018</a:t>
             </a:fld>
             <a:endParaRPr lang="en-US"/>
           </a:p>
@@ -654,7 +655,7 @@
           <a:p>
             <a:fld id="{78C97017-6FC3-485B-9764-EAC9E56C1D49}" type="datetimeFigureOut">
               <a:rPr lang="en-US" smtClean="0"/>
-              <a:t>11/8/18</a:t>
+              <a:t>11/8/2018</a:t>
             </a:fld>
             <a:endParaRPr lang="en-US"/>
           </a:p>
@@ -822,7 +823,7 @@
           <a:p>
             <a:fld id="{78C97017-6FC3-485B-9764-EAC9E56C1D49}" type="datetimeFigureOut">
               <a:rPr lang="en-US" smtClean="0"/>
-              <a:t>11/8/18</a:t>
+              <a:t>11/8/2018</a:t>
             </a:fld>
             <a:endParaRPr lang="en-US"/>
           </a:p>
@@ -1000,7 +1001,7 @@
           <a:p>
             <a:fld id="{78C97017-6FC3-485B-9764-EAC9E56C1D49}" type="datetimeFigureOut">
               <a:rPr lang="en-US" smtClean="0"/>
-              <a:t>11/8/18</a:t>
+              <a:t>11/8/2018</a:t>
             </a:fld>
             <a:endParaRPr lang="en-US"/>
           </a:p>
@@ -1168,7 +1169,7 @@
           <a:p>
             <a:fld id="{78C97017-6FC3-485B-9764-EAC9E56C1D49}" type="datetimeFigureOut">
               <a:rPr lang="en-US" smtClean="0"/>
-              <a:t>11/8/18</a:t>
+              <a:t>11/8/2018</a:t>
             </a:fld>
             <a:endParaRPr lang="en-US"/>
           </a:p>
@@ -1413,7 +1414,7 @@
           <a:p>
             <a:fld id="{78C97017-6FC3-485B-9764-EAC9E56C1D49}" type="datetimeFigureOut">
               <a:rPr lang="en-US" smtClean="0"/>
-              <a:t>11/8/18</a:t>
+              <a:t>11/8/2018</a:t>
             </a:fld>
             <a:endParaRPr lang="en-US"/>
           </a:p>
@@ -1698,7 +1699,7 @@
           <a:p>
             <a:fld id="{78C97017-6FC3-485B-9764-EAC9E56C1D49}" type="datetimeFigureOut">
               <a:rPr lang="en-US" smtClean="0"/>
-              <a:t>11/8/18</a:t>
+              <a:t>11/8/2018</a:t>
             </a:fld>
             <a:endParaRPr lang="en-US"/>
           </a:p>
@@ -2117,7 +2118,7 @@
           <a:p>
             <a:fld id="{78C97017-6FC3-485B-9764-EAC9E56C1D49}" type="datetimeFigureOut">
               <a:rPr lang="en-US" smtClean="0"/>
-              <a:t>11/8/18</a:t>
+              <a:t>11/8/2018</a:t>
             </a:fld>
             <a:endParaRPr lang="en-US"/>
           </a:p>
@@ -2234,7 +2235,7 @@
           <a:p>
             <a:fld id="{78C97017-6FC3-485B-9764-EAC9E56C1D49}" type="datetimeFigureOut">
               <a:rPr lang="en-US" smtClean="0"/>
-              <a:t>11/8/18</a:t>
+              <a:t>11/8/2018</a:t>
             </a:fld>
             <a:endParaRPr lang="en-US"/>
           </a:p>
@@ -2329,7 +2330,7 @@
           <a:p>
             <a:fld id="{78C97017-6FC3-485B-9764-EAC9E56C1D49}" type="datetimeFigureOut">
               <a:rPr lang="en-US" smtClean="0"/>
-              <a:t>11/8/18</a:t>
+              <a:t>11/8/2018</a:t>
             </a:fld>
             <a:endParaRPr lang="en-US"/>
           </a:p>
@@ -2604,7 +2605,7 @@
           <a:p>
             <a:fld id="{78C97017-6FC3-485B-9764-EAC9E56C1D49}" type="datetimeFigureOut">
               <a:rPr lang="en-US" smtClean="0"/>
-              <a:t>11/8/18</a:t>
+              <a:t>11/8/2018</a:t>
             </a:fld>
             <a:endParaRPr lang="en-US"/>
           </a:p>
@@ -2856,7 +2857,7 @@
           <a:p>
             <a:fld id="{78C97017-6FC3-485B-9764-EAC9E56C1D49}" type="datetimeFigureOut">
               <a:rPr lang="en-US" smtClean="0"/>
-              <a:t>11/8/18</a:t>
+              <a:t>11/8/2018</a:t>
             </a:fld>
             <a:endParaRPr lang="en-US"/>
           </a:p>
@@ -3067,7 +3068,7 @@
           <a:p>
             <a:fld id="{78C97017-6FC3-485B-9764-EAC9E56C1D49}" type="datetimeFigureOut">
               <a:rPr lang="en-US" smtClean="0"/>
-              <a:t>11/8/18</a:t>
+              <a:t>11/8/2018</a:t>
             </a:fld>
             <a:endParaRPr lang="en-US"/>
           </a:p>
@@ -5648,6 +5649,1503 @@
     <p:extLst>
       <p:ext uri="{BB962C8B-B14F-4D97-AF65-F5344CB8AC3E}">
         <p14:creationId xmlns:p14="http://schemas.microsoft.com/office/powerpoint/2010/main" val="1478832369"/>
+      </p:ext>
+    </p:extLst>
+  </p:cSld>
+  <p:clrMapOvr>
+    <a:masterClrMapping/>
+  </p:clrMapOvr>
+</p:sld>
+</file>
+
+<file path=ppt/slides/slide2.xml><?xml version="1.0" encoding="utf-8"?>
+<p:sld xmlns:a="http://schemas.openxmlformats.org/drawingml/2006/main" xmlns:r="http://schemas.openxmlformats.org/officeDocument/2006/relationships" xmlns:p="http://schemas.openxmlformats.org/presentationml/2006/main">
+  <p:cSld>
+    <p:spTree>
+      <p:nvGrpSpPr>
+        <p:cNvPr id="1" name=""/>
+        <p:cNvGrpSpPr/>
+        <p:nvPr/>
+      </p:nvGrpSpPr>
+      <p:grpSpPr>
+        <a:xfrm>
+          <a:off x="0" y="0"/>
+          <a:ext cx="0" cy="0"/>
+          <a:chOff x="0" y="0"/>
+          <a:chExt cx="0" cy="0"/>
+        </a:xfrm>
+      </p:grpSpPr>
+      <p:sp>
+        <p:nvSpPr>
+          <p:cNvPr id="2" name="Rectangle 65">
+            <a:extLst>
+              <a:ext uri="{FF2B5EF4-FFF2-40B4-BE49-F238E27FC236}">
+                <a16:creationId xmlns:a16="http://schemas.microsoft.com/office/drawing/2014/main" id="{C75F7AF0-21A8-4F8B-873C-AECC705065AE}"/>
+              </a:ext>
+            </a:extLst>
+          </p:cNvPr>
+          <p:cNvSpPr/>
+          <p:nvPr/>
+        </p:nvSpPr>
+        <p:spPr>
+          <a:xfrm>
+            <a:off x="352313" y="2133600"/>
+            <a:ext cx="8439374" cy="4100500"/>
+          </a:xfrm>
+          <a:prstGeom prst="roundRect">
+            <a:avLst>
+              <a:gd name="adj" fmla="val 3484"/>
+            </a:avLst>
+          </a:prstGeom>
+          <a:solidFill>
+            <a:schemeClr val="accent6">
+              <a:lumMod val="20000"/>
+              <a:lumOff val="80000"/>
+            </a:schemeClr>
+          </a:solidFill>
+          <a:ln w="19050">
+            <a:noFill/>
+          </a:ln>
+          <a:effectLst/>
+        </p:spPr>
+        <p:style>
+          <a:lnRef idx="1">
+            <a:schemeClr val="accent2"/>
+          </a:lnRef>
+          <a:fillRef idx="2">
+            <a:schemeClr val="accent2"/>
+          </a:fillRef>
+          <a:effectRef idx="1">
+            <a:schemeClr val="accent2"/>
+          </a:effectRef>
+          <a:fontRef idx="minor">
+            <a:schemeClr val="dk1"/>
+          </a:fontRef>
+        </p:style>
+        <p:txBody>
+          <a:bodyPr rtlCol="0" anchor="t"/>
+          <a:lstStyle/>
+          <a:p>
+            <a:r>
+              <a:rPr lang="en-US" sz="1200" b="1" dirty="0">
+                <a:solidFill>
+                  <a:schemeClr val="accent6">
+                    <a:lumMod val="75000"/>
+                  </a:schemeClr>
+                </a:solidFill>
+              </a:rPr>
+              <a:t>Storage System for Maker Manager – Read (Upon maker manager start up)</a:t>
+            </a:r>
+          </a:p>
+          <a:p>
+            <a:endParaRPr lang="en-SG" sz="1200" b="1" dirty="0">
+              <a:solidFill>
+                <a:schemeClr val="accent6">
+                  <a:lumMod val="75000"/>
+                </a:schemeClr>
+              </a:solidFill>
+            </a:endParaRPr>
+          </a:p>
+        </p:txBody>
+      </p:sp>
+      <p:sp>
+        <p:nvSpPr>
+          <p:cNvPr id="3" name="Rectangle 62">
+            <a:extLst>
+              <a:ext uri="{FF2B5EF4-FFF2-40B4-BE49-F238E27FC236}">
+                <a16:creationId xmlns:a16="http://schemas.microsoft.com/office/drawing/2014/main" id="{E1AECE54-D25B-43E7-B625-48434D4AEE35}"/>
+              </a:ext>
+            </a:extLst>
+          </p:cNvPr>
+          <p:cNvSpPr/>
+          <p:nvPr/>
+        </p:nvSpPr>
+        <p:spPr>
+          <a:xfrm>
+            <a:off x="672382" y="2495126"/>
+            <a:ext cx="1308818" cy="346760"/>
+          </a:xfrm>
+          <a:prstGeom prst="rect">
+            <a:avLst/>
+          </a:prstGeom>
+          <a:solidFill>
+            <a:schemeClr val="accent6">
+              <a:lumMod val="75000"/>
+            </a:schemeClr>
+          </a:solidFill>
+          <a:ln w="19050">
+            <a:solidFill>
+              <a:schemeClr val="accent6">
+                <a:lumMod val="75000"/>
+              </a:schemeClr>
+            </a:solidFill>
+          </a:ln>
+          <a:effectLst/>
+        </p:spPr>
+        <p:style>
+          <a:lnRef idx="1">
+            <a:schemeClr val="accent2"/>
+          </a:lnRef>
+          <a:fillRef idx="2">
+            <a:schemeClr val="accent2"/>
+          </a:fillRef>
+          <a:effectRef idx="1">
+            <a:schemeClr val="accent2"/>
+          </a:effectRef>
+          <a:fontRef idx="minor">
+            <a:schemeClr val="dk1"/>
+          </a:fontRef>
+        </p:style>
+        <p:txBody>
+          <a:bodyPr rtlCol="0" anchor="ctr"/>
+          <a:lstStyle/>
+          <a:p>
+            <a:pPr algn="ctr"/>
+            <a:r>
+              <a:rPr lang="en-US" sz="1050" dirty="0">
+                <a:solidFill>
+                  <a:schemeClr val="bg1"/>
+                </a:solidFill>
+              </a:rPr>
+              <a:t>:</a:t>
+            </a:r>
+            <a:r>
+              <a:rPr lang="en-US" sz="1050" dirty="0" err="1">
+                <a:solidFill>
+                  <a:schemeClr val="bg1"/>
+                </a:solidFill>
+              </a:rPr>
+              <a:t>StorageManager</a:t>
+            </a:r>
+            <a:endParaRPr lang="en-SG" sz="1050" dirty="0">
+              <a:solidFill>
+                <a:schemeClr val="bg1"/>
+              </a:solidFill>
+            </a:endParaRPr>
+          </a:p>
+        </p:txBody>
+      </p:sp>
+      <p:sp>
+        <p:nvSpPr>
+          <p:cNvPr id="4" name="Rectangle 3">
+            <a:extLst>
+              <a:ext uri="{FF2B5EF4-FFF2-40B4-BE49-F238E27FC236}">
+                <a16:creationId xmlns:a16="http://schemas.microsoft.com/office/drawing/2014/main" id="{572968C9-EA5D-41C1-B80A-F9ED26090AB6}"/>
+              </a:ext>
+            </a:extLst>
+          </p:cNvPr>
+          <p:cNvSpPr/>
+          <p:nvPr/>
+        </p:nvSpPr>
+        <p:spPr>
+          <a:xfrm>
+            <a:off x="1174391" y="3046820"/>
+            <a:ext cx="304800" cy="2974622"/>
+          </a:xfrm>
+          <a:prstGeom prst="rect">
+            <a:avLst/>
+          </a:prstGeom>
+          <a:solidFill>
+            <a:srgbClr val="E46C0A"/>
+          </a:solidFill>
+        </p:spPr>
+        <p:style>
+          <a:lnRef idx="2">
+            <a:schemeClr val="accent1">
+              <a:shade val="50000"/>
+            </a:schemeClr>
+          </a:lnRef>
+          <a:fillRef idx="1">
+            <a:schemeClr val="accent1"/>
+          </a:fillRef>
+          <a:effectRef idx="0">
+            <a:schemeClr val="accent1"/>
+          </a:effectRef>
+          <a:fontRef idx="minor">
+            <a:schemeClr val="lt1"/>
+          </a:fontRef>
+        </p:style>
+        <p:txBody>
+          <a:bodyPr rtlCol="0" anchor="ctr"/>
+          <a:lstStyle/>
+          <a:p>
+            <a:pPr algn="ctr"/>
+            <a:endParaRPr lang="en-SG" dirty="0"/>
+          </a:p>
+        </p:txBody>
+      </p:sp>
+      <p:cxnSp>
+        <p:nvCxnSpPr>
+          <p:cNvPr id="7" name="Elbow Connector 122">
+            <a:extLst>
+              <a:ext uri="{FF2B5EF4-FFF2-40B4-BE49-F238E27FC236}">
+                <a16:creationId xmlns:a16="http://schemas.microsoft.com/office/drawing/2014/main" id="{AD598393-BC80-4577-B2CB-013F3AB7F23B}"/>
+              </a:ext>
+            </a:extLst>
+          </p:cNvPr>
+          <p:cNvCxnSpPr>
+            <a:cxnSpLocks/>
+            <a:stCxn id="3" idx="2"/>
+          </p:cNvCxnSpPr>
+          <p:nvPr/>
+        </p:nvCxnSpPr>
+        <p:spPr>
+          <a:xfrm rot="16200000" flipH="1">
+            <a:off x="1224323" y="2944353"/>
+            <a:ext cx="204936" cy="1"/>
+          </a:xfrm>
+          <a:prstGeom prst="bentConnector3">
+            <a:avLst>
+              <a:gd name="adj1" fmla="val 50000"/>
+            </a:avLst>
+          </a:prstGeom>
+          <a:ln w="19050">
+            <a:solidFill>
+              <a:schemeClr val="bg1">
+                <a:lumMod val="75000"/>
+              </a:schemeClr>
+            </a:solidFill>
+            <a:prstDash val="sysDot"/>
+            <a:headEnd type="none" w="med" len="med"/>
+            <a:tailEnd type="arrow" w="med" len="med"/>
+          </a:ln>
+          <a:effectLst/>
+        </p:spPr>
+        <p:style>
+          <a:lnRef idx="1">
+            <a:schemeClr val="accent2"/>
+          </a:lnRef>
+          <a:fillRef idx="2">
+            <a:schemeClr val="accent2"/>
+          </a:fillRef>
+          <a:effectRef idx="1">
+            <a:schemeClr val="accent2"/>
+          </a:effectRef>
+          <a:fontRef idx="minor">
+            <a:schemeClr val="dk1"/>
+          </a:fontRef>
+        </p:style>
+      </p:cxnSp>
+      <p:sp>
+        <p:nvSpPr>
+          <p:cNvPr id="16" name="Rectangle 8">
+            <a:extLst>
+              <a:ext uri="{FF2B5EF4-FFF2-40B4-BE49-F238E27FC236}">
+                <a16:creationId xmlns:a16="http://schemas.microsoft.com/office/drawing/2014/main" id="{412A5C4A-76F0-4D32-A776-2AA9FF30B555}"/>
+              </a:ext>
+            </a:extLst>
+          </p:cNvPr>
+          <p:cNvSpPr/>
+          <p:nvPr/>
+        </p:nvSpPr>
+        <p:spPr>
+          <a:xfrm>
+            <a:off x="2476500" y="2509412"/>
+            <a:ext cx="1219200" cy="346760"/>
+          </a:xfrm>
+          <a:prstGeom prst="rect">
+            <a:avLst/>
+          </a:prstGeom>
+          <a:ln w="19050"/>
+          <a:effectLst/>
+        </p:spPr>
+        <p:style>
+          <a:lnRef idx="1">
+            <a:schemeClr val="accent6"/>
+          </a:lnRef>
+          <a:fillRef idx="2">
+            <a:schemeClr val="accent6"/>
+          </a:fillRef>
+          <a:effectRef idx="1">
+            <a:schemeClr val="accent6"/>
+          </a:effectRef>
+          <a:fontRef idx="minor">
+            <a:schemeClr val="dk1"/>
+          </a:fontRef>
+        </p:style>
+        <p:txBody>
+          <a:bodyPr rtlCol="0" anchor="ctr"/>
+          <a:lstStyle/>
+          <a:p>
+            <a:pPr algn="ctr"/>
+            <a:r>
+              <a:rPr lang="en-US" sz="1050" b="1" dirty="0">
+                <a:solidFill>
+                  <a:schemeClr val="accent6">
+                    <a:lumMod val="75000"/>
+                  </a:schemeClr>
+                </a:solidFill>
+              </a:rPr>
+              <a:t>:</a:t>
+            </a:r>
+            <a:r>
+              <a:rPr lang="en-US" sz="1050" b="1" dirty="0" err="1">
+                <a:solidFill>
+                  <a:schemeClr val="accent6">
+                    <a:lumMod val="75000"/>
+                  </a:schemeClr>
+                </a:solidFill>
+              </a:rPr>
+              <a:t>XmlAddressBook</a:t>
+            </a:r>
+            <a:br>
+              <a:rPr lang="en-US" sz="1050" b="1" dirty="0">
+                <a:solidFill>
+                  <a:schemeClr val="accent6">
+                    <a:lumMod val="75000"/>
+                  </a:schemeClr>
+                </a:solidFill>
+              </a:rPr>
+            </a:br>
+            <a:r>
+              <a:rPr lang="en-US" sz="1050" b="1" dirty="0">
+                <a:solidFill>
+                  <a:schemeClr val="accent6">
+                    <a:lumMod val="75000"/>
+                  </a:schemeClr>
+                </a:solidFill>
+              </a:rPr>
+              <a:t>Storage</a:t>
+            </a:r>
+            <a:endParaRPr lang="en-SG" sz="1050" b="1" dirty="0">
+              <a:solidFill>
+                <a:schemeClr val="accent6">
+                  <a:lumMod val="75000"/>
+                </a:schemeClr>
+              </a:solidFill>
+            </a:endParaRPr>
+          </a:p>
+        </p:txBody>
+      </p:sp>
+      <p:sp>
+        <p:nvSpPr>
+          <p:cNvPr id="17" name="Rectangle 16">
+            <a:extLst>
+              <a:ext uri="{FF2B5EF4-FFF2-40B4-BE49-F238E27FC236}">
+                <a16:creationId xmlns:a16="http://schemas.microsoft.com/office/drawing/2014/main" id="{C0A8F176-BB5F-4267-AB9F-0A14A025835A}"/>
+              </a:ext>
+            </a:extLst>
+          </p:cNvPr>
+          <p:cNvSpPr/>
+          <p:nvPr/>
+        </p:nvSpPr>
+        <p:spPr>
+          <a:xfrm>
+            <a:off x="2914379" y="3046820"/>
+            <a:ext cx="304800" cy="2974622"/>
+          </a:xfrm>
+          <a:prstGeom prst="rect">
+            <a:avLst/>
+          </a:prstGeom>
+          <a:solidFill>
+            <a:srgbClr val="FFCEA5"/>
+          </a:solidFill>
+          <a:ln>
+            <a:solidFill>
+              <a:srgbClr val="F69240"/>
+            </a:solidFill>
+          </a:ln>
+        </p:spPr>
+        <p:style>
+          <a:lnRef idx="2">
+            <a:schemeClr val="accent1">
+              <a:shade val="50000"/>
+            </a:schemeClr>
+          </a:lnRef>
+          <a:fillRef idx="1">
+            <a:schemeClr val="accent1"/>
+          </a:fillRef>
+          <a:effectRef idx="0">
+            <a:schemeClr val="accent1"/>
+          </a:effectRef>
+          <a:fontRef idx="minor">
+            <a:schemeClr val="lt1"/>
+          </a:fontRef>
+        </p:style>
+        <p:txBody>
+          <a:bodyPr rtlCol="0" anchor="ctr"/>
+          <a:lstStyle/>
+          <a:p>
+            <a:pPr algn="ctr"/>
+            <a:endParaRPr lang="en-SG" dirty="0"/>
+          </a:p>
+        </p:txBody>
+      </p:sp>
+      <p:cxnSp>
+        <p:nvCxnSpPr>
+          <p:cNvPr id="18" name="Elbow Connector 122">
+            <a:extLst>
+              <a:ext uri="{FF2B5EF4-FFF2-40B4-BE49-F238E27FC236}">
+                <a16:creationId xmlns:a16="http://schemas.microsoft.com/office/drawing/2014/main" id="{7E195698-4B80-4B08-81DC-57A23CD885E6}"/>
+              </a:ext>
+            </a:extLst>
+          </p:cNvPr>
+          <p:cNvCxnSpPr>
+            <a:cxnSpLocks/>
+          </p:cNvCxnSpPr>
+          <p:nvPr/>
+        </p:nvCxnSpPr>
+        <p:spPr>
+          <a:xfrm rot="16200000" flipH="1">
+            <a:off x="2964312" y="2971747"/>
+            <a:ext cx="204936" cy="1"/>
+          </a:xfrm>
+          <a:prstGeom prst="bentConnector3">
+            <a:avLst>
+              <a:gd name="adj1" fmla="val 50000"/>
+            </a:avLst>
+          </a:prstGeom>
+          <a:ln w="19050">
+            <a:solidFill>
+              <a:schemeClr val="bg1">
+                <a:lumMod val="75000"/>
+              </a:schemeClr>
+            </a:solidFill>
+            <a:prstDash val="sysDot"/>
+            <a:headEnd type="none" w="med" len="med"/>
+            <a:tailEnd type="arrow" w="med" len="med"/>
+          </a:ln>
+          <a:effectLst/>
+        </p:spPr>
+        <p:style>
+          <a:lnRef idx="1">
+            <a:schemeClr val="accent2"/>
+          </a:lnRef>
+          <a:fillRef idx="2">
+            <a:schemeClr val="accent2"/>
+          </a:fillRef>
+          <a:effectRef idx="1">
+            <a:schemeClr val="accent2"/>
+          </a:effectRef>
+          <a:fontRef idx="minor">
+            <a:schemeClr val="dk1"/>
+          </a:fontRef>
+        </p:style>
+      </p:cxnSp>
+      <p:cxnSp>
+        <p:nvCxnSpPr>
+          <p:cNvPr id="20" name="Straight Arrow Connector 19">
+            <a:extLst>
+              <a:ext uri="{FF2B5EF4-FFF2-40B4-BE49-F238E27FC236}">
+                <a16:creationId xmlns:a16="http://schemas.microsoft.com/office/drawing/2014/main" id="{7321EFC8-C928-45D4-A3C0-95F9BD65CF4C}"/>
+              </a:ext>
+            </a:extLst>
+          </p:cNvPr>
+          <p:cNvCxnSpPr/>
+          <p:nvPr/>
+        </p:nvCxnSpPr>
+        <p:spPr>
+          <a:xfrm>
+            <a:off x="1479191" y="3276600"/>
+            <a:ext cx="1435188" cy="0"/>
+          </a:xfrm>
+          <a:prstGeom prst="straightConnector1">
+            <a:avLst/>
+          </a:prstGeom>
+          <a:ln>
+            <a:tailEnd type="triangle"/>
+          </a:ln>
+        </p:spPr>
+        <p:style>
+          <a:lnRef idx="1">
+            <a:schemeClr val="accent1"/>
+          </a:lnRef>
+          <a:fillRef idx="0">
+            <a:schemeClr val="accent1"/>
+          </a:fillRef>
+          <a:effectRef idx="0">
+            <a:schemeClr val="accent1"/>
+          </a:effectRef>
+          <a:fontRef idx="minor">
+            <a:schemeClr val="tx1"/>
+          </a:fontRef>
+        </p:style>
+      </p:cxnSp>
+      <p:sp>
+        <p:nvSpPr>
+          <p:cNvPr id="21" name="TextBox 20">
+            <a:extLst>
+              <a:ext uri="{FF2B5EF4-FFF2-40B4-BE49-F238E27FC236}">
+                <a16:creationId xmlns:a16="http://schemas.microsoft.com/office/drawing/2014/main" id="{31099EDB-197F-4E06-9A5D-24059B6ECF74}"/>
+              </a:ext>
+            </a:extLst>
+          </p:cNvPr>
+          <p:cNvSpPr txBox="1"/>
+          <p:nvPr/>
+        </p:nvSpPr>
+        <p:spPr>
+          <a:xfrm>
+            <a:off x="1479191" y="3074216"/>
+            <a:ext cx="1435187" cy="215444"/>
+          </a:xfrm>
+          <a:prstGeom prst="rect">
+            <a:avLst/>
+          </a:prstGeom>
+          <a:noFill/>
+        </p:spPr>
+        <p:txBody>
+          <a:bodyPr wrap="square" rtlCol="0">
+            <a:spAutoFit/>
+          </a:bodyPr>
+          <a:lstStyle/>
+          <a:p>
+            <a:pPr algn="ctr"/>
+            <a:r>
+              <a:rPr lang="en-SG" sz="800" dirty="0"/>
+              <a:t>readAddressBook(UserPrefs)</a:t>
+            </a:r>
+          </a:p>
+        </p:txBody>
+      </p:sp>
+      <p:sp>
+        <p:nvSpPr>
+          <p:cNvPr id="22" name="Rectangle 8">
+            <a:extLst>
+              <a:ext uri="{FF2B5EF4-FFF2-40B4-BE49-F238E27FC236}">
+                <a16:creationId xmlns:a16="http://schemas.microsoft.com/office/drawing/2014/main" id="{BE53C1ED-9A76-4912-8627-28FF5A96628B}"/>
+              </a:ext>
+            </a:extLst>
+          </p:cNvPr>
+          <p:cNvSpPr/>
+          <p:nvPr/>
+        </p:nvSpPr>
+        <p:spPr>
+          <a:xfrm>
+            <a:off x="4349231" y="2508822"/>
+            <a:ext cx="1169835" cy="346760"/>
+          </a:xfrm>
+          <a:prstGeom prst="rect">
+            <a:avLst/>
+          </a:prstGeom>
+          <a:ln w="19050"/>
+          <a:effectLst/>
+        </p:spPr>
+        <p:style>
+          <a:lnRef idx="1">
+            <a:schemeClr val="accent6"/>
+          </a:lnRef>
+          <a:fillRef idx="2">
+            <a:schemeClr val="accent6"/>
+          </a:fillRef>
+          <a:effectRef idx="1">
+            <a:schemeClr val="accent6"/>
+          </a:effectRef>
+          <a:fontRef idx="minor">
+            <a:schemeClr val="dk1"/>
+          </a:fontRef>
+        </p:style>
+        <p:txBody>
+          <a:bodyPr rtlCol="0" anchor="ctr"/>
+          <a:lstStyle/>
+          <a:p>
+            <a:pPr algn="ctr"/>
+            <a:r>
+              <a:rPr lang="en-US" sz="1050" b="1" dirty="0">
+                <a:solidFill>
+                  <a:schemeClr val="accent6">
+                    <a:lumMod val="75000"/>
+                  </a:schemeClr>
+                </a:solidFill>
+              </a:rPr>
+              <a:t>:</a:t>
+            </a:r>
+            <a:r>
+              <a:rPr lang="en-US" sz="1050" b="1" dirty="0" err="1">
+                <a:solidFill>
+                  <a:schemeClr val="accent6">
+                    <a:lumMod val="75000"/>
+                  </a:schemeClr>
+                </a:solidFill>
+              </a:rPr>
+              <a:t>XmlFileStorage</a:t>
+            </a:r>
+            <a:endParaRPr lang="en-SG" sz="1050" b="1" dirty="0">
+              <a:solidFill>
+                <a:schemeClr val="accent6">
+                  <a:lumMod val="75000"/>
+                </a:schemeClr>
+              </a:solidFill>
+            </a:endParaRPr>
+          </a:p>
+        </p:txBody>
+      </p:sp>
+      <p:sp>
+        <p:nvSpPr>
+          <p:cNvPr id="23" name="Rectangle 22">
+            <a:extLst>
+              <a:ext uri="{FF2B5EF4-FFF2-40B4-BE49-F238E27FC236}">
+                <a16:creationId xmlns:a16="http://schemas.microsoft.com/office/drawing/2014/main" id="{31B12D54-E6F8-4D26-97DA-D4EAC1CBBEF5}"/>
+              </a:ext>
+            </a:extLst>
+          </p:cNvPr>
+          <p:cNvSpPr/>
+          <p:nvPr/>
+        </p:nvSpPr>
+        <p:spPr>
+          <a:xfrm>
+            <a:off x="4826883" y="3074216"/>
+            <a:ext cx="304800" cy="1977644"/>
+          </a:xfrm>
+          <a:prstGeom prst="rect">
+            <a:avLst/>
+          </a:prstGeom>
+          <a:solidFill>
+            <a:srgbClr val="FFCEA5"/>
+          </a:solidFill>
+          <a:ln>
+            <a:solidFill>
+              <a:srgbClr val="F69240"/>
+            </a:solidFill>
+          </a:ln>
+        </p:spPr>
+        <p:style>
+          <a:lnRef idx="2">
+            <a:schemeClr val="accent1">
+              <a:shade val="50000"/>
+            </a:schemeClr>
+          </a:lnRef>
+          <a:fillRef idx="1">
+            <a:schemeClr val="accent1"/>
+          </a:fillRef>
+          <a:effectRef idx="0">
+            <a:schemeClr val="accent1"/>
+          </a:effectRef>
+          <a:fontRef idx="minor">
+            <a:schemeClr val="lt1"/>
+          </a:fontRef>
+        </p:style>
+        <p:txBody>
+          <a:bodyPr rtlCol="0" anchor="ctr"/>
+          <a:lstStyle/>
+          <a:p>
+            <a:pPr algn="ctr"/>
+            <a:endParaRPr lang="en-SG" dirty="0"/>
+          </a:p>
+        </p:txBody>
+      </p:sp>
+      <p:cxnSp>
+        <p:nvCxnSpPr>
+          <p:cNvPr id="24" name="Elbow Connector 122">
+            <a:extLst>
+              <a:ext uri="{FF2B5EF4-FFF2-40B4-BE49-F238E27FC236}">
+                <a16:creationId xmlns:a16="http://schemas.microsoft.com/office/drawing/2014/main" id="{305F956A-D82A-42D1-9156-CA5ADD520A8E}"/>
+              </a:ext>
+            </a:extLst>
+          </p:cNvPr>
+          <p:cNvCxnSpPr>
+            <a:cxnSpLocks/>
+          </p:cNvCxnSpPr>
+          <p:nvPr/>
+        </p:nvCxnSpPr>
+        <p:spPr>
+          <a:xfrm rot="16200000" flipH="1">
+            <a:off x="4882503" y="2971747"/>
+            <a:ext cx="204936" cy="1"/>
+          </a:xfrm>
+          <a:prstGeom prst="bentConnector3">
+            <a:avLst>
+              <a:gd name="adj1" fmla="val 50000"/>
+            </a:avLst>
+          </a:prstGeom>
+          <a:ln w="19050">
+            <a:solidFill>
+              <a:schemeClr val="bg1">
+                <a:lumMod val="75000"/>
+              </a:schemeClr>
+            </a:solidFill>
+            <a:prstDash val="sysDot"/>
+            <a:headEnd type="none" w="med" len="med"/>
+            <a:tailEnd type="arrow" w="med" len="med"/>
+          </a:ln>
+          <a:effectLst/>
+        </p:spPr>
+        <p:style>
+          <a:lnRef idx="1">
+            <a:schemeClr val="accent2"/>
+          </a:lnRef>
+          <a:fillRef idx="2">
+            <a:schemeClr val="accent2"/>
+          </a:fillRef>
+          <a:effectRef idx="1">
+            <a:schemeClr val="accent2"/>
+          </a:effectRef>
+          <a:fontRef idx="minor">
+            <a:schemeClr val="dk1"/>
+          </a:fontRef>
+        </p:style>
+      </p:cxnSp>
+      <p:sp>
+        <p:nvSpPr>
+          <p:cNvPr id="25" name="TextBox 24">
+            <a:extLst>
+              <a:ext uri="{FF2B5EF4-FFF2-40B4-BE49-F238E27FC236}">
+                <a16:creationId xmlns:a16="http://schemas.microsoft.com/office/drawing/2014/main" id="{66A7E195-DAAA-41A8-8069-8BA07C886A5C}"/>
+              </a:ext>
+            </a:extLst>
+          </p:cNvPr>
+          <p:cNvSpPr txBox="1"/>
+          <p:nvPr/>
+        </p:nvSpPr>
+        <p:spPr>
+          <a:xfrm>
+            <a:off x="3161813" y="3961752"/>
+            <a:ext cx="948009" cy="338554"/>
+          </a:xfrm>
+          <a:prstGeom prst="rect">
+            <a:avLst/>
+          </a:prstGeom>
+          <a:noFill/>
+        </p:spPr>
+        <p:txBody>
+          <a:bodyPr wrap="square" rtlCol="0">
+            <a:spAutoFit/>
+          </a:bodyPr>
+          <a:lstStyle/>
+          <a:p>
+            <a:pPr algn="ctr"/>
+            <a:r>
+              <a:rPr lang="en-SG" sz="800" dirty="0"/>
+              <a:t>readAddressBook</a:t>
+            </a:r>
+          </a:p>
+          <a:p>
+            <a:pPr algn="ctr"/>
+            <a:r>
+              <a:rPr lang="en-SG" sz="800" dirty="0"/>
+              <a:t>(UserPrefs)</a:t>
+            </a:r>
+          </a:p>
+        </p:txBody>
+      </p:sp>
+      <p:cxnSp>
+        <p:nvCxnSpPr>
+          <p:cNvPr id="57" name="Elbow Connector 85">
+            <a:extLst>
+              <a:ext uri="{FF2B5EF4-FFF2-40B4-BE49-F238E27FC236}">
+                <a16:creationId xmlns:a16="http://schemas.microsoft.com/office/drawing/2014/main" id="{F8231989-72C1-4F6F-9C59-3FF170C5F59E}"/>
+              </a:ext>
+            </a:extLst>
+          </p:cNvPr>
+          <p:cNvCxnSpPr>
+            <a:cxnSpLocks/>
+          </p:cNvCxnSpPr>
+          <p:nvPr/>
+        </p:nvCxnSpPr>
+        <p:spPr>
+          <a:xfrm>
+            <a:off x="3486421" y="4371756"/>
+            <a:ext cx="1332601" cy="312568"/>
+          </a:xfrm>
+          <a:prstGeom prst="bentConnector3">
+            <a:avLst>
+              <a:gd name="adj1" fmla="val 49464"/>
+            </a:avLst>
+          </a:prstGeom>
+          <a:ln w="19050">
+            <a:solidFill>
+              <a:srgbClr val="7030A0"/>
+            </a:solidFill>
+            <a:headEnd type="none" w="med" len="med"/>
+            <a:tailEnd type="arrow" w="med" len="med"/>
+          </a:ln>
+          <a:effectLst/>
+        </p:spPr>
+        <p:style>
+          <a:lnRef idx="1">
+            <a:schemeClr val="accent2"/>
+          </a:lnRef>
+          <a:fillRef idx="2">
+            <a:schemeClr val="accent2"/>
+          </a:fillRef>
+          <a:effectRef idx="1">
+            <a:schemeClr val="accent2"/>
+          </a:effectRef>
+          <a:fontRef idx="minor">
+            <a:schemeClr val="dk1"/>
+          </a:fontRef>
+        </p:style>
+      </p:cxnSp>
+      <p:sp>
+        <p:nvSpPr>
+          <p:cNvPr id="58" name="Flowchart: Decision 96">
+            <a:extLst>
+              <a:ext uri="{FF2B5EF4-FFF2-40B4-BE49-F238E27FC236}">
+                <a16:creationId xmlns:a16="http://schemas.microsoft.com/office/drawing/2014/main" id="{7D4F868C-41DE-4C5C-A858-A38142F5D974}"/>
+              </a:ext>
+            </a:extLst>
+          </p:cNvPr>
+          <p:cNvSpPr/>
+          <p:nvPr/>
+        </p:nvSpPr>
+        <p:spPr>
+          <a:xfrm>
+            <a:off x="3234776" y="4285066"/>
+            <a:ext cx="236048" cy="173380"/>
+          </a:xfrm>
+          <a:prstGeom prst="flowChartDecision">
+            <a:avLst/>
+          </a:prstGeom>
+          <a:solidFill>
+            <a:srgbClr val="7030A0"/>
+          </a:solidFill>
+          <a:ln w="19050">
+            <a:solidFill>
+              <a:srgbClr val="7030A0"/>
+            </a:solidFill>
+          </a:ln>
+          <a:effectLst/>
+        </p:spPr>
+        <p:style>
+          <a:lnRef idx="1">
+            <a:schemeClr val="accent6"/>
+          </a:lnRef>
+          <a:fillRef idx="2">
+            <a:schemeClr val="accent6"/>
+          </a:fillRef>
+          <a:effectRef idx="1">
+            <a:schemeClr val="accent6"/>
+          </a:effectRef>
+          <a:fontRef idx="minor">
+            <a:schemeClr val="dk1"/>
+          </a:fontRef>
+        </p:style>
+        <p:txBody>
+          <a:bodyPr rtlCol="0" anchor="ctr"/>
+          <a:lstStyle/>
+          <a:p>
+            <a:pPr algn="ctr"/>
+            <a:endParaRPr lang="en-US" sz="1050"/>
+          </a:p>
+        </p:txBody>
+      </p:sp>
+      <p:cxnSp>
+        <p:nvCxnSpPr>
+          <p:cNvPr id="61" name="Elbow Connector 85">
+            <a:extLst>
+              <a:ext uri="{FF2B5EF4-FFF2-40B4-BE49-F238E27FC236}">
+                <a16:creationId xmlns:a16="http://schemas.microsoft.com/office/drawing/2014/main" id="{DE11573D-BD04-443F-BE26-BF35FFFE7E37}"/>
+              </a:ext>
+            </a:extLst>
+          </p:cNvPr>
+          <p:cNvCxnSpPr>
+            <a:cxnSpLocks/>
+            <a:stCxn id="58" idx="3"/>
+          </p:cNvCxnSpPr>
+          <p:nvPr/>
+        </p:nvCxnSpPr>
+        <p:spPr>
+          <a:xfrm flipV="1">
+            <a:off x="3470824" y="4113544"/>
+            <a:ext cx="1348198" cy="258212"/>
+          </a:xfrm>
+          <a:prstGeom prst="bentConnector3">
+            <a:avLst>
+              <a:gd name="adj1" fmla="val 50000"/>
+            </a:avLst>
+          </a:prstGeom>
+          <a:ln w="19050">
+            <a:solidFill>
+              <a:srgbClr val="7030A0"/>
+            </a:solidFill>
+            <a:headEnd type="none" w="med" len="med"/>
+            <a:tailEnd type="arrow" w="med" len="med"/>
+          </a:ln>
+          <a:effectLst/>
+        </p:spPr>
+        <p:style>
+          <a:lnRef idx="1">
+            <a:schemeClr val="accent2"/>
+          </a:lnRef>
+          <a:fillRef idx="2">
+            <a:schemeClr val="accent2"/>
+          </a:fillRef>
+          <a:effectRef idx="1">
+            <a:schemeClr val="accent2"/>
+          </a:effectRef>
+          <a:fontRef idx="minor">
+            <a:schemeClr val="dk1"/>
+          </a:fontRef>
+        </p:style>
+      </p:cxnSp>
+      <p:sp>
+        <p:nvSpPr>
+          <p:cNvPr id="72" name="TextBox 71">
+            <a:extLst>
+              <a:ext uri="{FF2B5EF4-FFF2-40B4-BE49-F238E27FC236}">
+                <a16:creationId xmlns:a16="http://schemas.microsoft.com/office/drawing/2014/main" id="{EFCE9E4F-1467-4FA1-B8C0-55878DD8507A}"/>
+              </a:ext>
+            </a:extLst>
+          </p:cNvPr>
+          <p:cNvSpPr txBox="1"/>
+          <p:nvPr/>
+        </p:nvSpPr>
+        <p:spPr>
+          <a:xfrm>
+            <a:off x="3936240" y="4724400"/>
+            <a:ext cx="948009" cy="215444"/>
+          </a:xfrm>
+          <a:prstGeom prst="rect">
+            <a:avLst/>
+          </a:prstGeom>
+          <a:noFill/>
+        </p:spPr>
+        <p:txBody>
+          <a:bodyPr wrap="square" rtlCol="0">
+            <a:spAutoFit/>
+          </a:bodyPr>
+          <a:lstStyle/>
+          <a:p>
+            <a:pPr algn="ctr"/>
+            <a:r>
+              <a:rPr lang="en-SG" sz="800" dirty="0" err="1"/>
+              <a:t>machinesFilePath</a:t>
+            </a:r>
+            <a:endParaRPr lang="en-SG" sz="800" dirty="0"/>
+          </a:p>
+        </p:txBody>
+      </p:sp>
+      <p:sp>
+        <p:nvSpPr>
+          <p:cNvPr id="73" name="TextBox 72">
+            <a:extLst>
+              <a:ext uri="{FF2B5EF4-FFF2-40B4-BE49-F238E27FC236}">
+                <a16:creationId xmlns:a16="http://schemas.microsoft.com/office/drawing/2014/main" id="{AAC249DE-5AEA-426B-A9BE-738A98EEFD2B}"/>
+              </a:ext>
+            </a:extLst>
+          </p:cNvPr>
+          <p:cNvSpPr txBox="1"/>
+          <p:nvPr/>
+        </p:nvSpPr>
+        <p:spPr>
+          <a:xfrm>
+            <a:off x="3936241" y="3898100"/>
+            <a:ext cx="948009" cy="215444"/>
+          </a:xfrm>
+          <a:prstGeom prst="rect">
+            <a:avLst/>
+          </a:prstGeom>
+          <a:noFill/>
+        </p:spPr>
+        <p:txBody>
+          <a:bodyPr wrap="square" rtlCol="0">
+            <a:spAutoFit/>
+          </a:bodyPr>
+          <a:lstStyle/>
+          <a:p>
+            <a:pPr algn="ctr"/>
+            <a:r>
+              <a:rPr lang="en-SG" sz="800" dirty="0" err="1"/>
+              <a:t>adminsFilePath</a:t>
+            </a:r>
+            <a:endParaRPr lang="en-SG" sz="800" dirty="0"/>
+          </a:p>
+        </p:txBody>
+      </p:sp>
+      <p:sp>
+        <p:nvSpPr>
+          <p:cNvPr id="79" name="Rectangle 8">
+            <a:extLst>
+              <a:ext uri="{FF2B5EF4-FFF2-40B4-BE49-F238E27FC236}">
+                <a16:creationId xmlns:a16="http://schemas.microsoft.com/office/drawing/2014/main" id="{44727643-C886-4976-8F72-4F7CB3F71185}"/>
+              </a:ext>
+            </a:extLst>
+          </p:cNvPr>
+          <p:cNvSpPr/>
+          <p:nvPr/>
+        </p:nvSpPr>
+        <p:spPr>
+          <a:xfrm>
+            <a:off x="6484575" y="2516442"/>
+            <a:ext cx="1169835" cy="346760"/>
+          </a:xfrm>
+          <a:prstGeom prst="rect">
+            <a:avLst/>
+          </a:prstGeom>
+          <a:ln w="19050"/>
+          <a:effectLst/>
+        </p:spPr>
+        <p:style>
+          <a:lnRef idx="1">
+            <a:schemeClr val="accent6"/>
+          </a:lnRef>
+          <a:fillRef idx="2">
+            <a:schemeClr val="accent6"/>
+          </a:fillRef>
+          <a:effectRef idx="1">
+            <a:schemeClr val="accent6"/>
+          </a:effectRef>
+          <a:fontRef idx="minor">
+            <a:schemeClr val="dk1"/>
+          </a:fontRef>
+        </p:style>
+        <p:txBody>
+          <a:bodyPr rtlCol="0" anchor="ctr"/>
+          <a:lstStyle/>
+          <a:p>
+            <a:pPr algn="ctr"/>
+            <a:r>
+              <a:rPr lang="en-US" sz="1050" b="1" dirty="0">
+                <a:solidFill>
+                  <a:schemeClr val="accent6">
+                    <a:lumMod val="75000"/>
+                  </a:schemeClr>
+                </a:solidFill>
+              </a:rPr>
+              <a:t>:Xml Data</a:t>
+            </a:r>
+            <a:endParaRPr lang="en-SG" sz="1050" b="1" dirty="0">
+              <a:solidFill>
+                <a:schemeClr val="accent6">
+                  <a:lumMod val="75000"/>
+                </a:schemeClr>
+              </a:solidFill>
+            </a:endParaRPr>
+          </a:p>
+        </p:txBody>
+      </p:sp>
+      <p:sp>
+        <p:nvSpPr>
+          <p:cNvPr id="80" name="Rectangle 79">
+            <a:extLst>
+              <a:ext uri="{FF2B5EF4-FFF2-40B4-BE49-F238E27FC236}">
+                <a16:creationId xmlns:a16="http://schemas.microsoft.com/office/drawing/2014/main" id="{927BE278-2516-49B5-8A80-AB29C2C977BF}"/>
+              </a:ext>
+            </a:extLst>
+          </p:cNvPr>
+          <p:cNvSpPr/>
+          <p:nvPr/>
+        </p:nvSpPr>
+        <p:spPr>
+          <a:xfrm>
+            <a:off x="6959866" y="3054440"/>
+            <a:ext cx="304800" cy="2974622"/>
+          </a:xfrm>
+          <a:prstGeom prst="rect">
+            <a:avLst/>
+          </a:prstGeom>
+          <a:solidFill>
+            <a:srgbClr val="FFCEA5"/>
+          </a:solidFill>
+          <a:ln>
+            <a:solidFill>
+              <a:srgbClr val="FF0000"/>
+            </a:solidFill>
+          </a:ln>
+        </p:spPr>
+        <p:style>
+          <a:lnRef idx="2">
+            <a:schemeClr val="accent1">
+              <a:shade val="50000"/>
+            </a:schemeClr>
+          </a:lnRef>
+          <a:fillRef idx="1">
+            <a:schemeClr val="accent1"/>
+          </a:fillRef>
+          <a:effectRef idx="0">
+            <a:schemeClr val="accent1"/>
+          </a:effectRef>
+          <a:fontRef idx="minor">
+            <a:schemeClr val="lt1"/>
+          </a:fontRef>
+        </p:style>
+        <p:txBody>
+          <a:bodyPr rtlCol="0" anchor="ctr"/>
+          <a:lstStyle/>
+          <a:p>
+            <a:pPr algn="ctr"/>
+            <a:endParaRPr lang="en-SG" dirty="0"/>
+          </a:p>
+        </p:txBody>
+      </p:sp>
+      <p:cxnSp>
+        <p:nvCxnSpPr>
+          <p:cNvPr id="81" name="Elbow Connector 122">
+            <a:extLst>
+              <a:ext uri="{FF2B5EF4-FFF2-40B4-BE49-F238E27FC236}">
+                <a16:creationId xmlns:a16="http://schemas.microsoft.com/office/drawing/2014/main" id="{2EC4E164-989F-4B7A-98AA-36CF5E9B2C31}"/>
+              </a:ext>
+            </a:extLst>
+          </p:cNvPr>
+          <p:cNvCxnSpPr>
+            <a:cxnSpLocks/>
+          </p:cNvCxnSpPr>
+          <p:nvPr/>
+        </p:nvCxnSpPr>
+        <p:spPr>
+          <a:xfrm rot="16200000" flipH="1">
+            <a:off x="7009799" y="2952560"/>
+            <a:ext cx="204936" cy="1"/>
+          </a:xfrm>
+          <a:prstGeom prst="bentConnector3">
+            <a:avLst>
+              <a:gd name="adj1" fmla="val 50000"/>
+            </a:avLst>
+          </a:prstGeom>
+          <a:ln w="19050">
+            <a:solidFill>
+              <a:schemeClr val="bg1">
+                <a:lumMod val="75000"/>
+              </a:schemeClr>
+            </a:solidFill>
+            <a:prstDash val="sysDot"/>
+            <a:headEnd type="none" w="med" len="med"/>
+            <a:tailEnd type="arrow" w="med" len="med"/>
+          </a:ln>
+          <a:effectLst/>
+        </p:spPr>
+        <p:style>
+          <a:lnRef idx="1">
+            <a:schemeClr val="accent2"/>
+          </a:lnRef>
+          <a:fillRef idx="2">
+            <a:schemeClr val="accent2"/>
+          </a:fillRef>
+          <a:effectRef idx="1">
+            <a:schemeClr val="accent2"/>
+          </a:effectRef>
+          <a:fontRef idx="minor">
+            <a:schemeClr val="dk1"/>
+          </a:fontRef>
+        </p:style>
+      </p:cxnSp>
+      <p:cxnSp>
+        <p:nvCxnSpPr>
+          <p:cNvPr id="82" name="Elbow Connector 29">
+            <a:extLst>
+              <a:ext uri="{FF2B5EF4-FFF2-40B4-BE49-F238E27FC236}">
+                <a16:creationId xmlns:a16="http://schemas.microsoft.com/office/drawing/2014/main" id="{CE675501-BA8C-4659-BDF5-884D7D722D78}"/>
+              </a:ext>
+            </a:extLst>
+          </p:cNvPr>
+          <p:cNvCxnSpPr>
+            <a:cxnSpLocks/>
+          </p:cNvCxnSpPr>
+          <p:nvPr/>
+        </p:nvCxnSpPr>
+        <p:spPr>
+          <a:xfrm>
+            <a:off x="5139544" y="4371756"/>
+            <a:ext cx="1849505" cy="12700"/>
+          </a:xfrm>
+          <a:prstGeom prst="bentConnector3">
+            <a:avLst>
+              <a:gd name="adj1" fmla="val 302"/>
+            </a:avLst>
+          </a:prstGeom>
+          <a:ln w="19050">
+            <a:solidFill>
+              <a:srgbClr val="7030A0"/>
+            </a:solidFill>
+            <a:headEnd type="none" w="med" len="med"/>
+            <a:tailEnd type="arrow" w="med" len="med"/>
+          </a:ln>
+          <a:effectLst/>
+        </p:spPr>
+        <p:style>
+          <a:lnRef idx="1">
+            <a:schemeClr val="accent2"/>
+          </a:lnRef>
+          <a:fillRef idx="2">
+            <a:schemeClr val="accent2"/>
+          </a:fillRef>
+          <a:effectRef idx="1">
+            <a:schemeClr val="accent2"/>
+          </a:effectRef>
+          <a:fontRef idx="minor">
+            <a:schemeClr val="dk1"/>
+          </a:fontRef>
+        </p:style>
+      </p:cxnSp>
+      <p:sp>
+        <p:nvSpPr>
+          <p:cNvPr id="86" name="TextBox 85">
+            <a:extLst>
+              <a:ext uri="{FF2B5EF4-FFF2-40B4-BE49-F238E27FC236}">
+                <a16:creationId xmlns:a16="http://schemas.microsoft.com/office/drawing/2014/main" id="{FDA4FBCA-7846-4171-8A01-B0DABA19E0AF}"/>
+              </a:ext>
+            </a:extLst>
+          </p:cNvPr>
+          <p:cNvSpPr txBox="1"/>
+          <p:nvPr/>
+        </p:nvSpPr>
+        <p:spPr>
+          <a:xfrm>
+            <a:off x="5100551" y="4041927"/>
+            <a:ext cx="1820322" cy="338554"/>
+          </a:xfrm>
+          <a:prstGeom prst="rect">
+            <a:avLst/>
+          </a:prstGeom>
+          <a:noFill/>
+        </p:spPr>
+        <p:txBody>
+          <a:bodyPr wrap="square" rtlCol="0">
+            <a:spAutoFit/>
+          </a:bodyPr>
+          <a:lstStyle/>
+          <a:p>
+            <a:pPr algn="ctr"/>
+            <a:r>
+              <a:rPr lang="en-SG" sz="800" dirty="0" err="1"/>
+              <a:t>XmlUtil.loadDataFromFilePath</a:t>
+            </a:r>
+            <a:endParaRPr lang="en-SG" sz="800" dirty="0"/>
+          </a:p>
+          <a:p>
+            <a:pPr algn="ctr"/>
+            <a:r>
+              <a:rPr lang="en-SG" sz="800" dirty="0"/>
+              <a:t>(</a:t>
+            </a:r>
+            <a:r>
+              <a:rPr lang="en-SG" sz="800" dirty="0" err="1"/>
+              <a:t>FilePath</a:t>
+            </a:r>
+            <a:r>
+              <a:rPr lang="en-SG" sz="800" dirty="0"/>
+              <a:t>, </a:t>
+            </a:r>
+            <a:r>
+              <a:rPr lang="en-SG" sz="800" dirty="0" err="1"/>
+              <a:t>XmlClassSerializableFormat</a:t>
+            </a:r>
+            <a:r>
+              <a:rPr lang="en-SG" sz="800" dirty="0"/>
+              <a:t>)</a:t>
+            </a:r>
+          </a:p>
+        </p:txBody>
+      </p:sp>
+      <p:cxnSp>
+        <p:nvCxnSpPr>
+          <p:cNvPr id="93" name="Straight Arrow Connector 92">
+            <a:extLst>
+              <a:ext uri="{FF2B5EF4-FFF2-40B4-BE49-F238E27FC236}">
+                <a16:creationId xmlns:a16="http://schemas.microsoft.com/office/drawing/2014/main" id="{2357016B-77F7-428F-ACA6-5EAD7CBE28D7}"/>
+              </a:ext>
+            </a:extLst>
+          </p:cNvPr>
+          <p:cNvCxnSpPr>
+            <a:cxnSpLocks/>
+          </p:cNvCxnSpPr>
+          <p:nvPr/>
+        </p:nvCxnSpPr>
+        <p:spPr>
+          <a:xfrm flipH="1">
+            <a:off x="3234776" y="5562600"/>
+            <a:ext cx="3686098" cy="0"/>
+          </a:xfrm>
+          <a:prstGeom prst="straightConnector1">
+            <a:avLst/>
+          </a:prstGeom>
+          <a:ln>
+            <a:tailEnd type="triangle"/>
+          </a:ln>
+        </p:spPr>
+        <p:style>
+          <a:lnRef idx="2">
+            <a:schemeClr val="accent1"/>
+          </a:lnRef>
+          <a:fillRef idx="0">
+            <a:schemeClr val="accent1"/>
+          </a:fillRef>
+          <a:effectRef idx="1">
+            <a:schemeClr val="accent1"/>
+          </a:effectRef>
+          <a:fontRef idx="minor">
+            <a:schemeClr val="tx1"/>
+          </a:fontRef>
+        </p:style>
+      </p:cxnSp>
+      <p:sp>
+        <p:nvSpPr>
+          <p:cNvPr id="95" name="TextBox 94">
+            <a:extLst>
+              <a:ext uri="{FF2B5EF4-FFF2-40B4-BE49-F238E27FC236}">
+                <a16:creationId xmlns:a16="http://schemas.microsoft.com/office/drawing/2014/main" id="{CE6E86A1-5027-4F92-82EA-F02C7EC3C261}"/>
+              </a:ext>
+            </a:extLst>
+          </p:cNvPr>
+          <p:cNvSpPr txBox="1"/>
+          <p:nvPr/>
+        </p:nvSpPr>
+        <p:spPr>
+          <a:xfrm>
+            <a:off x="4049905" y="5573034"/>
+            <a:ext cx="2179278" cy="215444"/>
+          </a:xfrm>
+          <a:prstGeom prst="rect">
+            <a:avLst/>
+          </a:prstGeom>
+          <a:noFill/>
+        </p:spPr>
+        <p:txBody>
+          <a:bodyPr wrap="square" rtlCol="0">
+            <a:spAutoFit/>
+          </a:bodyPr>
+          <a:lstStyle/>
+          <a:p>
+            <a:pPr algn="ctr"/>
+            <a:r>
+              <a:rPr lang="en-SG" sz="800" dirty="0"/>
+              <a:t>Stores read data in an Address Book</a:t>
+            </a:r>
+          </a:p>
+        </p:txBody>
+      </p:sp>
+      <p:sp>
+        <p:nvSpPr>
+          <p:cNvPr id="96" name="TextBox 95">
+            <a:extLst>
+              <a:ext uri="{FF2B5EF4-FFF2-40B4-BE49-F238E27FC236}">
+                <a16:creationId xmlns:a16="http://schemas.microsoft.com/office/drawing/2014/main" id="{70A45FB2-B2E4-498C-9640-009DD5575187}"/>
+              </a:ext>
+            </a:extLst>
+          </p:cNvPr>
+          <p:cNvSpPr txBox="1"/>
+          <p:nvPr/>
+        </p:nvSpPr>
+        <p:spPr>
+          <a:xfrm>
+            <a:off x="4049905" y="5359841"/>
+            <a:ext cx="2179278" cy="215444"/>
+          </a:xfrm>
+          <a:prstGeom prst="rect">
+            <a:avLst/>
+          </a:prstGeom>
+          <a:noFill/>
+        </p:spPr>
+        <p:txBody>
+          <a:bodyPr wrap="square" rtlCol="0">
+            <a:spAutoFit/>
+          </a:bodyPr>
+          <a:lstStyle/>
+          <a:p>
+            <a:pPr algn="ctr"/>
+            <a:r>
+              <a:rPr lang="en-SG" sz="800" dirty="0"/>
+              <a:t>Converting data into java objects</a:t>
+            </a:r>
+          </a:p>
+        </p:txBody>
+      </p:sp>
+      <p:cxnSp>
+        <p:nvCxnSpPr>
+          <p:cNvPr id="97" name="Straight Arrow Connector 96">
+            <a:extLst>
+              <a:ext uri="{FF2B5EF4-FFF2-40B4-BE49-F238E27FC236}">
+                <a16:creationId xmlns:a16="http://schemas.microsoft.com/office/drawing/2014/main" id="{FA2A4D8F-C04B-430C-913A-47860C551533}"/>
+              </a:ext>
+            </a:extLst>
+          </p:cNvPr>
+          <p:cNvCxnSpPr>
+            <a:cxnSpLocks/>
+          </p:cNvCxnSpPr>
+          <p:nvPr/>
+        </p:nvCxnSpPr>
+        <p:spPr>
+          <a:xfrm flipH="1">
+            <a:off x="1479191" y="5573034"/>
+            <a:ext cx="1435187" cy="0"/>
+          </a:xfrm>
+          <a:prstGeom prst="straightConnector1">
+            <a:avLst/>
+          </a:prstGeom>
+          <a:ln>
+            <a:tailEnd type="triangle"/>
+          </a:ln>
+        </p:spPr>
+        <p:style>
+          <a:lnRef idx="2">
+            <a:schemeClr val="accent1"/>
+          </a:lnRef>
+          <a:fillRef idx="0">
+            <a:schemeClr val="accent1"/>
+          </a:fillRef>
+          <a:effectRef idx="1">
+            <a:schemeClr val="accent1"/>
+          </a:effectRef>
+          <a:fontRef idx="minor">
+            <a:schemeClr val="tx1"/>
+          </a:fontRef>
+        </p:style>
+      </p:cxnSp>
+      <p:sp>
+        <p:nvSpPr>
+          <p:cNvPr id="99" name="TextBox 98">
+            <a:extLst>
+              <a:ext uri="{FF2B5EF4-FFF2-40B4-BE49-F238E27FC236}">
+                <a16:creationId xmlns:a16="http://schemas.microsoft.com/office/drawing/2014/main" id="{0354ADD7-00FD-48AE-B6CC-9549FE44920C}"/>
+              </a:ext>
+            </a:extLst>
+          </p:cNvPr>
+          <p:cNvSpPr txBox="1"/>
+          <p:nvPr/>
+        </p:nvSpPr>
+        <p:spPr>
+          <a:xfrm>
+            <a:off x="1435766" y="5562600"/>
+            <a:ext cx="1507187" cy="346760"/>
+          </a:xfrm>
+          <a:prstGeom prst="rect">
+            <a:avLst/>
+          </a:prstGeom>
+          <a:noFill/>
+        </p:spPr>
+        <p:txBody>
+          <a:bodyPr wrap="square" rtlCol="0">
+            <a:spAutoFit/>
+          </a:bodyPr>
+          <a:lstStyle/>
+          <a:p>
+            <a:pPr algn="ctr"/>
+            <a:r>
+              <a:rPr lang="en-SG" sz="800" dirty="0"/>
+              <a:t>Return address book containing read xml data</a:t>
+            </a:r>
+          </a:p>
+        </p:txBody>
+      </p:sp>
+      <p:sp>
+        <p:nvSpPr>
+          <p:cNvPr id="100" name="TextBox 99">
+            <a:extLst>
+              <a:ext uri="{FF2B5EF4-FFF2-40B4-BE49-F238E27FC236}">
+                <a16:creationId xmlns:a16="http://schemas.microsoft.com/office/drawing/2014/main" id="{FC0020B1-F2B9-46D0-9273-71DB4124D50E}"/>
+              </a:ext>
+            </a:extLst>
+          </p:cNvPr>
+          <p:cNvSpPr txBox="1"/>
+          <p:nvPr/>
+        </p:nvSpPr>
+        <p:spPr>
+          <a:xfrm>
+            <a:off x="1479191" y="5334097"/>
+            <a:ext cx="1507187" cy="215444"/>
+          </a:xfrm>
+          <a:prstGeom prst="rect">
+            <a:avLst/>
+          </a:prstGeom>
+          <a:noFill/>
+        </p:spPr>
+        <p:txBody>
+          <a:bodyPr wrap="square" rtlCol="0">
+            <a:spAutoFit/>
+          </a:bodyPr>
+          <a:lstStyle/>
+          <a:p>
+            <a:pPr algn="ctr"/>
+            <a:r>
+              <a:rPr lang="en-SG" sz="800" dirty="0"/>
+              <a:t>toModelType()</a:t>
+            </a:r>
+          </a:p>
+        </p:txBody>
+      </p:sp>
+    </p:spTree>
+    <p:extLst>
+      <p:ext uri="{BB962C8B-B14F-4D97-AF65-F5344CB8AC3E}">
+        <p14:creationId xmlns:p14="http://schemas.microsoft.com/office/powerpoint/2010/main" val="2677494807"/>
       </p:ext>
     </p:extLst>
   </p:cSld>

</xml_diff>